<commit_message>
Backup: All my local changes before sync - HR, Assets, Inventory, Hundi, Tenders, etc.
</commit_message>
<xml_diff>
--- a/MandirSync_Presentation.pptx
+++ b/MandirSync_Presentation.pptx
@@ -2,7 +2,7 @@
 <file path=ppt/presentation.xml><?xml version="1.0" encoding="utf-8"?>
 <p:presentation xmlns:a="http://schemas.openxmlformats.org/drawingml/2006/main" xmlns:r="http://schemas.openxmlformats.org/officeDocument/2006/relationships" xmlns:p="http://schemas.openxmlformats.org/presentationml/2006/main" saveSubsetFonts="1" autoCompressPictures="0">
   <p:sldMasterIdLst>
-    <p:sldMasterId id="2147483877" r:id="rId1"/>
+    <p:sldMasterId id="2147483923" r:id="rId1"/>
   </p:sldMasterIdLst>
   <p:notesMasterIdLst>
     <p:notesMasterId r:id="rId31"/>
@@ -676,16 +676,8 @@
 </file>
 
 <file path=ppt/slideLayouts/slideLayout1.xml><?xml version="1.0" encoding="utf-8"?>
-<p:sldLayout xmlns:a="http://schemas.openxmlformats.org/drawingml/2006/main" xmlns:r="http://schemas.openxmlformats.org/officeDocument/2006/relationships" xmlns:p="http://schemas.openxmlformats.org/presentationml/2006/main" type="title" preserve="1">
+<p:sldLayout xmlns:a="http://schemas.openxmlformats.org/drawingml/2006/main" xmlns:r="http://schemas.openxmlformats.org/officeDocument/2006/relationships" xmlns:p="http://schemas.openxmlformats.org/presentationml/2006/main" showMasterSp="0" type="title" preserve="1">
   <p:cSld name="Title Slide">
-    <p:bg>
-      <p:bgPr>
-        <a:solidFill>
-          <a:schemeClr val="accent1"/>
-        </a:solidFill>
-        <a:effectLst/>
-      </p:bgPr>
-    </p:bg>
     <p:spTree>
       <p:nvGrpSpPr>
         <p:cNvPr id="1" name=""/>
@@ -702,18 +694,21 @@
       </p:grpSpPr>
       <p:sp>
         <p:nvSpPr>
-          <p:cNvPr id="4" name="Rectangle 3"/>
+          <p:cNvPr id="7" name="Rectangle 6"/>
           <p:cNvSpPr/>
           <p:nvPr/>
         </p:nvSpPr>
         <p:spPr>
           <a:xfrm>
-            <a:off x="0" y="0"/>
-            <a:ext cx="9144000" cy="6858000"/>
-          </a:xfrm>
-          <a:prstGeom prst="rect">
-            <a:avLst/>
-          </a:prstGeom>
+            <a:off x="1" y="762000"/>
+            <a:ext cx="6856214" cy="5334001"/>
+          </a:xfrm>
+          <a:prstGeom prst="rect">
+            <a:avLst/>
+          </a:prstGeom>
+          <a:solidFill>
+            <a:schemeClr val="accent1"/>
+          </a:solidFill>
           <a:ln>
             <a:noFill/>
           </a:ln>
@@ -737,6 +732,46 @@
       </p:sp>
       <p:sp>
         <p:nvSpPr>
+          <p:cNvPr id="8" name="Rectangle 7"/>
+          <p:cNvSpPr/>
+          <p:nvPr/>
+        </p:nvSpPr>
+        <p:spPr>
+          <a:xfrm>
+            <a:off x="6952697" y="762000"/>
+            <a:ext cx="2193989" cy="5334001"/>
+          </a:xfrm>
+          <a:prstGeom prst="rect">
+            <a:avLst/>
+          </a:prstGeom>
+          <a:solidFill>
+            <a:srgbClr val="C3C3C3">
+              <a:alpha val="49804"/>
+            </a:srgbClr>
+          </a:solidFill>
+          <a:ln>
+            <a:noFill/>
+          </a:ln>
+        </p:spPr>
+        <p:style>
+          <a:lnRef idx="2">
+            <a:schemeClr val="accent1">
+              <a:shade val="50000"/>
+            </a:schemeClr>
+          </a:lnRef>
+          <a:fillRef idx="1">
+            <a:schemeClr val="accent1"/>
+          </a:fillRef>
+          <a:effectRef idx="0">
+            <a:schemeClr val="accent1"/>
+          </a:effectRef>
+          <a:fontRef idx="minor">
+            <a:schemeClr val="lt1"/>
+          </a:fontRef>
+        </p:style>
+      </p:sp>
+      <p:sp>
+        <p:nvSpPr>
           <p:cNvPr id="2" name="Title 1"/>
           <p:cNvSpPr>
             <a:spLocks noGrp="1"/>
@@ -747,20 +782,17 @@
         </p:nvSpPr>
         <p:spPr>
           <a:xfrm>
-            <a:off x="452628" y="770467"/>
-            <a:ext cx="8086725" cy="3352800"/>
+            <a:off x="802386" y="1298448"/>
+            <a:ext cx="5486400" cy="3255264"/>
           </a:xfrm>
         </p:spPr>
         <p:txBody>
           <a:bodyPr anchor="b">
-            <a:noAutofit/>
+            <a:normAutofit/>
           </a:bodyPr>
           <a:lstStyle>
             <a:lvl1pPr algn="l">
-              <a:lnSpc>
-                <a:spcPct val="80000"/>
-              </a:lnSpc>
-              <a:defRPr sz="8000" spc="-120" baseline="0">
+              <a:defRPr sz="5400" spc="-100" baseline="0">
                 <a:solidFill>
                   <a:srgbClr val="FFFFFF"/>
                 </a:solidFill>
@@ -788,31 +820,33 @@
         </p:nvSpPr>
         <p:spPr>
           <a:xfrm>
-            <a:off x="500634" y="4198409"/>
-            <a:ext cx="6921151" cy="1645920"/>
-          </a:xfrm>
-        </p:spPr>
-        <p:txBody>
-          <a:bodyPr>
+            <a:off x="825011" y="4670246"/>
+            <a:ext cx="5486400" cy="914400"/>
+          </a:xfrm>
+        </p:spPr>
+        <p:txBody>
+          <a:bodyPr anchor="t">
             <a:normAutofit/>
           </a:bodyPr>
           <a:lstStyle>
             <a:lvl1pPr marL="0" indent="0" algn="l">
               <a:buNone/>
-              <a:defRPr sz="2800">
-                <a:solidFill>
-                  <a:srgbClr val="262626"/>
-                </a:solidFill>
-                <a:latin typeface="+mj-lt"/>
+              <a:defRPr sz="2000" cap="none" spc="0" baseline="0">
+                <a:solidFill>
+                  <a:schemeClr val="accent1">
+                    <a:lumMod val="20000"/>
+                    <a:lumOff val="80000"/>
+                  </a:schemeClr>
+                </a:solidFill>
               </a:defRPr>
             </a:lvl1pPr>
             <a:lvl2pPr marL="457200" indent="0" algn="ctr">
               <a:buNone/>
-              <a:defRPr sz="2800"/>
+              <a:defRPr sz="2000"/>
             </a:lvl2pPr>
             <a:lvl3pPr marL="914400" indent="0" algn="ctr">
               <a:buNone/>
-              <a:defRPr sz="2400"/>
+              <a:defRPr sz="2000"/>
             </a:lvl3pPr>
             <a:lvl4pPr marL="1371600" indent="0" algn="ctr">
               <a:buNone/>
@@ -850,7 +884,7 @@
       </p:sp>
       <p:sp>
         <p:nvSpPr>
-          <p:cNvPr id="7" name="Date Placeholder 6"/>
+          <p:cNvPr id="4" name="Date Placeholder 3"/>
           <p:cNvSpPr>
             <a:spLocks noGrp="1"/>
           </p:cNvSpPr>
@@ -861,17 +895,7 @@
         <p:spPr/>
         <p:txBody>
           <a:bodyPr/>
-          <a:lstStyle>
-            <a:lvl1pPr>
-              <a:defRPr>
-                <a:solidFill>
-                  <a:srgbClr val="FFFFFF">
-                    <a:alpha val="75000"/>
-                  </a:srgbClr>
-                </a:solidFill>
-              </a:defRPr>
-            </a:lvl1pPr>
-          </a:lstStyle>
+          <a:lstStyle/>
           <a:p>
             <a:fld id="{5BCAD085-E8A6-8845-BD4E-CB4CCA059FC4}" type="datetimeFigureOut">
               <a:rPr lang="en-US" smtClean="0"/>
@@ -883,7 +907,7 @@
       </p:sp>
       <p:sp>
         <p:nvSpPr>
-          <p:cNvPr id="8" name="Footer Placeholder 7"/>
+          <p:cNvPr id="5" name="Footer Placeholder 4"/>
           <p:cNvSpPr>
             <a:spLocks noGrp="1"/>
           </p:cNvSpPr>
@@ -894,17 +918,7 @@
         <p:spPr/>
         <p:txBody>
           <a:bodyPr/>
-          <a:lstStyle>
-            <a:lvl1pPr>
-              <a:defRPr>
-                <a:solidFill>
-                  <a:srgbClr val="FFFFFF">
-                    <a:alpha val="75000"/>
-                  </a:srgbClr>
-                </a:solidFill>
-              </a:defRPr>
-            </a:lvl1pPr>
-          </a:lstStyle>
+          <a:lstStyle/>
           <a:p>
             <a:endParaRPr lang="en-US"/>
           </a:p>
@@ -912,7 +926,7 @@
       </p:sp>
       <p:sp>
         <p:nvSpPr>
-          <p:cNvPr id="9" name="Slide Number Placeholder 8"/>
+          <p:cNvPr id="6" name="Slide Number Placeholder 5"/>
           <p:cNvSpPr>
             <a:spLocks noGrp="1"/>
           </p:cNvSpPr>
@@ -923,17 +937,7 @@
         <p:spPr/>
         <p:txBody>
           <a:bodyPr/>
-          <a:lstStyle>
-            <a:lvl1pPr>
-              <a:defRPr>
-                <a:solidFill>
-                  <a:srgbClr val="FFFFFF">
-                    <a:alpha val="20000"/>
-                  </a:srgbClr>
-                </a:solidFill>
-              </a:defRPr>
-            </a:lvl1pPr>
-          </a:lstStyle>
+          <a:lstStyle/>
           <a:p>
             <a:fld id="{C1FF6DA9-008F-8B48-92A6-B652298478BF}" type="slidenum">
               <a:rPr lang="en-US" smtClean="0"/>
@@ -946,7 +950,7 @@
     </p:spTree>
     <p:extLst>
       <p:ext uri="{BB962C8B-B14F-4D97-AF65-F5344CB8AC3E}">
-        <p14:creationId xmlns:p14="http://schemas.microsoft.com/office/powerpoint/2010/main" val="260143579"/>
+        <p14:creationId xmlns:p14="http://schemas.microsoft.com/office/powerpoint/2010/main" val="3615736514"/>
       </p:ext>
     </p:extLst>
   </p:cSld>
@@ -1008,7 +1012,7 @@
         </p:nvSpPr>
         <p:spPr/>
         <p:txBody>
-          <a:bodyPr vert="eaVert"/>
+          <a:bodyPr vert="eaVert" anchor="t"/>
           <a:lstStyle/>
           <a:p>
             <a:pPr lvl="0"/>
@@ -1050,7 +1054,7 @@
       </p:sp>
       <p:sp>
         <p:nvSpPr>
-          <p:cNvPr id="4" name="Date Placeholder 3"/>
+          <p:cNvPr id="7" name="Date Placeholder 6"/>
           <p:cNvSpPr>
             <a:spLocks noGrp="1"/>
           </p:cNvSpPr>
@@ -1073,7 +1077,7 @@
       </p:sp>
       <p:sp>
         <p:nvSpPr>
-          <p:cNvPr id="5" name="Footer Placeholder 4"/>
+          <p:cNvPr id="8" name="Footer Placeholder 7"/>
           <p:cNvSpPr>
             <a:spLocks noGrp="1"/>
           </p:cNvSpPr>
@@ -1092,7 +1096,7 @@
       </p:sp>
       <p:sp>
         <p:nvSpPr>
-          <p:cNvPr id="6" name="Slide Number Placeholder 5"/>
+          <p:cNvPr id="9" name="Slide Number Placeholder 8"/>
           <p:cNvSpPr>
             <a:spLocks noGrp="1"/>
           </p:cNvSpPr>
@@ -1116,7 +1120,7 @@
     </p:spTree>
     <p:extLst>
       <p:ext uri="{BB962C8B-B14F-4D97-AF65-F5344CB8AC3E}">
-        <p14:creationId xmlns:p14="http://schemas.microsoft.com/office/powerpoint/2010/main" val="3700399259"/>
+        <p14:creationId xmlns:p14="http://schemas.microsoft.com/office/powerpoint/2010/main" val="3305687722"/>
       </p:ext>
     </p:extLst>
   </p:cSld>
@@ -1155,8 +1159,8 @@
         </p:nvSpPr>
         <p:spPr>
           <a:xfrm>
-            <a:off x="6557963" y="695325"/>
-            <a:ext cx="1971675" cy="4800600"/>
+            <a:off x="285750" y="990600"/>
+            <a:ext cx="2114550" cy="4953000"/>
           </a:xfrm>
         </p:spPr>
         <p:txBody>
@@ -1183,12 +1187,12 @@
         </p:nvSpPr>
         <p:spPr>
           <a:xfrm>
-            <a:off x="578644" y="714376"/>
-            <a:ext cx="5800725" cy="5400675"/>
-          </a:xfrm>
-        </p:spPr>
-        <p:txBody>
-          <a:bodyPr vert="eaVert"/>
+            <a:off x="2900934" y="868680"/>
+            <a:ext cx="5486400" cy="5120640"/>
+          </a:xfrm>
+        </p:spPr>
+        <p:txBody>
+          <a:bodyPr vert="eaVert" anchor="t"/>
           <a:lstStyle/>
           <a:p>
             <a:pPr lvl="0"/>
@@ -1230,7 +1234,7 @@
       </p:sp>
       <p:sp>
         <p:nvSpPr>
-          <p:cNvPr id="4" name="Date Placeholder 3"/>
+          <p:cNvPr id="7" name="Date Placeholder 6"/>
           <p:cNvSpPr>
             <a:spLocks noGrp="1"/>
           </p:cNvSpPr>
@@ -1253,7 +1257,7 @@
       </p:sp>
       <p:sp>
         <p:nvSpPr>
-          <p:cNvPr id="5" name="Footer Placeholder 4"/>
+          <p:cNvPr id="8" name="Footer Placeholder 7"/>
           <p:cNvSpPr>
             <a:spLocks noGrp="1"/>
           </p:cNvSpPr>
@@ -1272,7 +1276,7 @@
       </p:sp>
       <p:sp>
         <p:nvSpPr>
-          <p:cNvPr id="6" name="Slide Number Placeholder 5"/>
+          <p:cNvPr id="9" name="Slide Number Placeholder 8"/>
           <p:cNvSpPr>
             <a:spLocks noGrp="1"/>
           </p:cNvSpPr>
@@ -1296,7 +1300,7 @@
     </p:spTree>
     <p:extLst>
       <p:ext uri="{BB962C8B-B14F-4D97-AF65-F5344CB8AC3E}">
-        <p14:creationId xmlns:p14="http://schemas.microsoft.com/office/powerpoint/2010/main" val="981731288"/>
+        <p14:creationId xmlns:p14="http://schemas.microsoft.com/office/powerpoint/2010/main" val="1793929121"/>
       </p:ext>
     </p:extLst>
   </p:cSld>
@@ -1466,7 +1470,7 @@
     </p:spTree>
     <p:extLst>
       <p:ext uri="{BB962C8B-B14F-4D97-AF65-F5344CB8AC3E}">
-        <p14:creationId xmlns:p14="http://schemas.microsoft.com/office/powerpoint/2010/main" val="1271698425"/>
+        <p14:creationId xmlns:p14="http://schemas.microsoft.com/office/powerpoint/2010/main" val="1841538076"/>
       </p:ext>
     </p:extLst>
   </p:cSld>
@@ -1505,8 +1509,8 @@
         </p:nvSpPr>
         <p:spPr>
           <a:xfrm>
-            <a:off x="452628" y="767419"/>
-            <a:ext cx="8085582" cy="3355848"/>
+            <a:off x="2900934" y="1298448"/>
+            <a:ext cx="5486400" cy="3255264"/>
           </a:xfrm>
         </p:spPr>
         <p:txBody>
@@ -1515,12 +1519,12 @@
           </a:bodyPr>
           <a:lstStyle>
             <a:lvl1pPr>
-              <a:lnSpc>
-                <a:spcPct val="80000"/>
-              </a:lnSpc>
-              <a:defRPr sz="8000" b="0" baseline="0">
-                <a:solidFill>
-                  <a:schemeClr val="accent1"/>
+              <a:defRPr sz="5400" b="0" spc="-100" baseline="0">
+                <a:solidFill>
+                  <a:schemeClr val="tx1">
+                    <a:lumMod val="65000"/>
+                    <a:lumOff val="35000"/>
+                  </a:schemeClr>
                 </a:solidFill>
               </a:defRPr>
             </a:lvl1pPr>
@@ -1546,8 +1550,8 @@
         </p:nvSpPr>
         <p:spPr>
           <a:xfrm>
-            <a:off x="500634" y="4187275"/>
-            <a:ext cx="6919722" cy="1645920"/>
+            <a:off x="2914650" y="4672584"/>
+            <a:ext cx="5486400" cy="914400"/>
           </a:xfrm>
         </p:spPr>
         <p:txBody>
@@ -1557,11 +1561,13 @@
           <a:lstStyle>
             <a:lvl1pPr marL="0" indent="0">
               <a:buNone/>
-              <a:defRPr sz="2800">
-                <a:solidFill>
-                  <a:schemeClr val="tx1"/>
-                </a:solidFill>
-                <a:latin typeface="+mj-lt"/>
+              <a:defRPr sz="2000" cap="none" spc="0" baseline="0">
+                <a:solidFill>
+                  <a:schemeClr val="tx1">
+                    <a:lumMod val="65000"/>
+                    <a:lumOff val="35000"/>
+                  </a:schemeClr>
+                </a:solidFill>
               </a:defRPr>
             </a:lvl1pPr>
             <a:lvl2pPr marL="457200" indent="0">
@@ -1722,7 +1728,7 @@
     </p:spTree>
     <p:extLst>
       <p:ext uri="{BB962C8B-B14F-4D97-AF65-F5344CB8AC3E}">
-        <p14:creationId xmlns:p14="http://schemas.microsoft.com/office/powerpoint/2010/main" val="330955160"/>
+        <p14:creationId xmlns:p14="http://schemas.microsoft.com/office/powerpoint/2010/main" val="3013736862"/>
       </p:ext>
     </p:extLst>
   </p:cSld>
@@ -1784,39 +1790,39 @@
         </p:nvSpPr>
         <p:spPr>
           <a:xfrm>
-            <a:off x="507492" y="1993392"/>
-            <a:ext cx="3806190" cy="3767328"/>
+            <a:off x="2900934" y="868680"/>
+            <a:ext cx="2606040" cy="5120640"/>
           </a:xfrm>
         </p:spPr>
         <p:txBody>
           <a:bodyPr/>
           <a:lstStyle>
             <a:lvl1pPr>
-              <a:defRPr sz="2200"/>
+              <a:defRPr sz="1900"/>
             </a:lvl1pPr>
             <a:lvl2pPr>
-              <a:defRPr sz="1900"/>
+              <a:defRPr sz="1700"/>
             </a:lvl2pPr>
             <a:lvl3pPr>
-              <a:defRPr sz="1700"/>
+              <a:defRPr sz="1500"/>
             </a:lvl3pPr>
             <a:lvl4pPr>
-              <a:defRPr sz="1500"/>
+              <a:defRPr sz="1300"/>
             </a:lvl4pPr>
             <a:lvl5pPr>
-              <a:defRPr sz="1400"/>
+              <a:defRPr sz="1300"/>
             </a:lvl5pPr>
             <a:lvl6pPr>
-              <a:defRPr sz="1400"/>
+              <a:defRPr sz="1300"/>
             </a:lvl6pPr>
             <a:lvl7pPr>
-              <a:defRPr sz="1400"/>
+              <a:defRPr sz="1300"/>
             </a:lvl7pPr>
             <a:lvl8pPr>
-              <a:defRPr sz="1400"/>
+              <a:defRPr sz="1300"/>
             </a:lvl8pPr>
             <a:lvl9pPr>
-              <a:defRPr sz="1400"/>
+              <a:defRPr sz="1300"/>
             </a:lvl9pPr>
           </a:lstStyle>
           <a:p>
@@ -1869,39 +1875,39 @@
         </p:nvSpPr>
         <p:spPr>
           <a:xfrm>
-            <a:off x="4757738" y="1993392"/>
-            <a:ext cx="3806190" cy="3767328"/>
+            <a:off x="5863590" y="868680"/>
+            <a:ext cx="2606040" cy="5120640"/>
           </a:xfrm>
         </p:spPr>
         <p:txBody>
           <a:bodyPr/>
           <a:lstStyle>
             <a:lvl1pPr>
-              <a:defRPr sz="2200"/>
+              <a:defRPr sz="1900"/>
             </a:lvl1pPr>
             <a:lvl2pPr>
-              <a:defRPr sz="1900"/>
+              <a:defRPr sz="1700"/>
             </a:lvl2pPr>
             <a:lvl3pPr>
-              <a:defRPr sz="1700"/>
+              <a:defRPr sz="1500"/>
             </a:lvl3pPr>
             <a:lvl4pPr>
-              <a:defRPr sz="1500"/>
+              <a:defRPr sz="1300"/>
             </a:lvl4pPr>
             <a:lvl5pPr>
-              <a:defRPr sz="1400"/>
+              <a:defRPr sz="1300"/>
             </a:lvl5pPr>
             <a:lvl6pPr>
-              <a:defRPr sz="1400"/>
+              <a:defRPr sz="1300"/>
             </a:lvl6pPr>
             <a:lvl7pPr>
-              <a:defRPr sz="1400"/>
+              <a:defRPr sz="1300"/>
             </a:lvl7pPr>
             <a:lvl8pPr>
-              <a:defRPr sz="1400"/>
+              <a:defRPr sz="1300"/>
             </a:lvl8pPr>
             <a:lvl9pPr>
-              <a:defRPr sz="1400"/>
+              <a:defRPr sz="1300"/>
             </a:lvl9pPr>
           </a:lstStyle>
           <a:p>
@@ -1944,7 +1950,7 @@
       </p:sp>
       <p:sp>
         <p:nvSpPr>
-          <p:cNvPr id="5" name="Date Placeholder 4"/>
+          <p:cNvPr id="8" name="Date Placeholder 7"/>
           <p:cNvSpPr>
             <a:spLocks noGrp="1"/>
           </p:cNvSpPr>
@@ -1967,7 +1973,7 @@
       </p:sp>
       <p:sp>
         <p:nvSpPr>
-          <p:cNvPr id="6" name="Footer Placeholder 5"/>
+          <p:cNvPr id="9" name="Footer Placeholder 8"/>
           <p:cNvSpPr>
             <a:spLocks noGrp="1"/>
           </p:cNvSpPr>
@@ -1986,7 +1992,7 @@
       </p:sp>
       <p:sp>
         <p:nvSpPr>
-          <p:cNvPr id="7" name="Slide Number Placeholder 6"/>
+          <p:cNvPr id="10" name="Slide Number Placeholder 9"/>
           <p:cNvSpPr>
             <a:spLocks noGrp="1"/>
           </p:cNvSpPr>
@@ -2010,7 +2016,7 @@
     </p:spTree>
     <p:extLst>
       <p:ext uri="{BB962C8B-B14F-4D97-AF65-F5344CB8AC3E}">
-        <p14:creationId xmlns:p14="http://schemas.microsoft.com/office/powerpoint/2010/main" val="2278776920"/>
+        <p14:creationId xmlns:p14="http://schemas.microsoft.com/office/powerpoint/2010/main" val="1166406199"/>
       </p:ext>
     </p:extLst>
   </p:cSld>
@@ -2072,12 +2078,12 @@
         </p:nvSpPr>
         <p:spPr>
           <a:xfrm>
-            <a:off x="507492" y="2032000"/>
-            <a:ext cx="3806190" cy="723400"/>
-          </a:xfrm>
-        </p:spPr>
-        <p:txBody>
-          <a:bodyPr anchor="ctr">
+            <a:off x="2900934" y="1023586"/>
+            <a:ext cx="2606040" cy="807720"/>
+          </a:xfrm>
+        </p:spPr>
+        <p:txBody>
+          <a:bodyPr anchor="b">
             <a:normAutofit/>
           </a:bodyPr>
           <a:lstStyle>
@@ -2086,19 +2092,18 @@
                 <a:spcPts val="0"/>
               </a:spcBef>
               <a:buNone/>
-              <a:defRPr sz="2000" b="0" cap="all" baseline="0">
+              <a:defRPr sz="1900" b="1">
                 <a:solidFill>
                   <a:schemeClr val="tx1">
-                    <a:lumMod val="85000"/>
-                    <a:lumOff val="15000"/>
+                    <a:lumMod val="65000"/>
+                    <a:lumOff val="35000"/>
                   </a:schemeClr>
                 </a:solidFill>
-                <a:latin typeface="+mj-lt"/>
               </a:defRPr>
             </a:lvl1pPr>
             <a:lvl2pPr marL="457200" indent="0">
               <a:buNone/>
-              <a:defRPr sz="2000" b="1"/>
+              <a:defRPr sz="1900" b="1"/>
             </a:lvl2pPr>
             <a:lvl3pPr marL="914400" indent="0">
               <a:buNone/>
@@ -2150,39 +2155,39 @@
         </p:nvSpPr>
         <p:spPr>
           <a:xfrm>
-            <a:off x="507492" y="2736150"/>
-            <a:ext cx="3806190" cy="3200400"/>
+            <a:off x="2900934" y="1930936"/>
+            <a:ext cx="2606040" cy="4023360"/>
           </a:xfrm>
         </p:spPr>
         <p:txBody>
           <a:bodyPr/>
           <a:lstStyle>
             <a:lvl1pPr>
-              <a:defRPr sz="2100"/>
+              <a:defRPr sz="1900"/>
             </a:lvl1pPr>
             <a:lvl2pPr>
-              <a:defRPr sz="1800"/>
+              <a:defRPr sz="1700"/>
             </a:lvl2pPr>
             <a:lvl3pPr>
-              <a:defRPr sz="1600"/>
+              <a:defRPr sz="1500"/>
             </a:lvl3pPr>
             <a:lvl4pPr>
-              <a:defRPr sz="1400"/>
+              <a:defRPr sz="1300"/>
             </a:lvl4pPr>
             <a:lvl5pPr>
-              <a:defRPr sz="1400"/>
+              <a:defRPr sz="1300"/>
             </a:lvl5pPr>
             <a:lvl6pPr>
-              <a:defRPr sz="1400"/>
+              <a:defRPr sz="1300"/>
             </a:lvl6pPr>
             <a:lvl7pPr>
-              <a:defRPr sz="1400"/>
+              <a:defRPr sz="1300"/>
             </a:lvl7pPr>
             <a:lvl8pPr>
-              <a:defRPr sz="1400"/>
+              <a:defRPr sz="1300"/>
             </a:lvl8pPr>
             <a:lvl9pPr>
-              <a:defRPr sz="1400"/>
+              <a:defRPr sz="1300"/>
             </a:lvl9pPr>
           </a:lstStyle>
           <a:p>
@@ -2235,12 +2240,12 @@
         </p:nvSpPr>
         <p:spPr>
           <a:xfrm>
-            <a:off x="4766310" y="2029968"/>
-            <a:ext cx="3806190" cy="722376"/>
-          </a:xfrm>
-        </p:spPr>
-        <p:txBody>
-          <a:bodyPr anchor="ctr">
+            <a:off x="5863847" y="1023587"/>
+            <a:ext cx="2606040" cy="813171"/>
+          </a:xfrm>
+        </p:spPr>
+        <p:txBody>
+          <a:bodyPr anchor="b">
             <a:normAutofit/>
           </a:bodyPr>
           <a:lstStyle>
@@ -2249,13 +2254,18 @@
                 <a:spcPts val="0"/>
               </a:spcBef>
               <a:buNone/>
-              <a:defRPr sz="2000" b="0" cap="all" baseline="0">
-                <a:latin typeface="+mj-lt"/>
+              <a:defRPr sz="1900" b="1">
+                <a:solidFill>
+                  <a:schemeClr val="tx1">
+                    <a:lumMod val="65000"/>
+                    <a:lumOff val="35000"/>
+                  </a:schemeClr>
+                </a:solidFill>
               </a:defRPr>
             </a:lvl1pPr>
             <a:lvl2pPr marL="457200" indent="0">
               <a:buNone/>
-              <a:defRPr sz="2000" b="1"/>
+              <a:defRPr sz="1900" b="1"/>
             </a:lvl2pPr>
             <a:lvl3pPr marL="914400" indent="0">
               <a:buNone/>
@@ -2307,15 +2317,442 @@
         </p:nvSpPr>
         <p:spPr>
           <a:xfrm>
-            <a:off x="4766310" y="2734056"/>
-            <a:ext cx="3806190" cy="3200400"/>
+            <a:off x="5863847" y="1930936"/>
+            <a:ext cx="2606040" cy="4023360"/>
           </a:xfrm>
         </p:spPr>
         <p:txBody>
           <a:bodyPr/>
           <a:lstStyle>
             <a:lvl1pPr>
-              <a:defRPr sz="2100"/>
+              <a:defRPr sz="1900"/>
+            </a:lvl1pPr>
+            <a:lvl2pPr>
+              <a:defRPr sz="1700"/>
+            </a:lvl2pPr>
+            <a:lvl3pPr>
+              <a:defRPr sz="1500"/>
+            </a:lvl3pPr>
+            <a:lvl4pPr>
+              <a:defRPr sz="1300"/>
+            </a:lvl4pPr>
+            <a:lvl5pPr>
+              <a:defRPr sz="1300"/>
+            </a:lvl5pPr>
+            <a:lvl6pPr>
+              <a:defRPr sz="1300"/>
+            </a:lvl6pPr>
+            <a:lvl7pPr>
+              <a:defRPr sz="1300"/>
+            </a:lvl7pPr>
+            <a:lvl8pPr>
+              <a:defRPr sz="1300"/>
+            </a:lvl8pPr>
+            <a:lvl9pPr>
+              <a:defRPr sz="1300"/>
+            </a:lvl9pPr>
+          </a:lstStyle>
+          <a:p>
+            <a:pPr lvl="0"/>
+            <a:r>
+              <a:rPr lang="en-US"/>
+              <a:t>Click to edit Master text styles</a:t>
+            </a:r>
+          </a:p>
+          <a:p>
+            <a:pPr lvl="1"/>
+            <a:r>
+              <a:rPr lang="en-US"/>
+              <a:t>Second level</a:t>
+            </a:r>
+          </a:p>
+          <a:p>
+            <a:pPr lvl="2"/>
+            <a:r>
+              <a:rPr lang="en-US"/>
+              <a:t>Third level</a:t>
+            </a:r>
+          </a:p>
+          <a:p>
+            <a:pPr lvl="3"/>
+            <a:r>
+              <a:rPr lang="en-US"/>
+              <a:t>Fourth level</a:t>
+            </a:r>
+          </a:p>
+          <a:p>
+            <a:pPr lvl="4"/>
+            <a:r>
+              <a:rPr lang="en-US"/>
+              <a:t>Fifth level</a:t>
+            </a:r>
+            <a:endParaRPr lang="en-US" dirty="0"/>
+          </a:p>
+        </p:txBody>
+      </p:sp>
+      <p:sp>
+        <p:nvSpPr>
+          <p:cNvPr id="2" name="Date Placeholder 1"/>
+          <p:cNvSpPr>
+            <a:spLocks noGrp="1"/>
+          </p:cNvSpPr>
+          <p:nvPr>
+            <p:ph type="dt" sz="half" idx="10"/>
+          </p:nvPr>
+        </p:nvSpPr>
+        <p:spPr/>
+        <p:txBody>
+          <a:bodyPr/>
+          <a:lstStyle/>
+          <a:p>
+            <a:fld id="{5BCAD085-E8A6-8845-BD4E-CB4CCA059FC4}" type="datetimeFigureOut">
+              <a:rPr lang="en-US" smtClean="0"/>
+              <a:t>11/27/2025</a:t>
+            </a:fld>
+            <a:endParaRPr lang="en-US"/>
+          </a:p>
+        </p:txBody>
+      </p:sp>
+      <p:sp>
+        <p:nvSpPr>
+          <p:cNvPr id="11" name="Footer Placeholder 10"/>
+          <p:cNvSpPr>
+            <a:spLocks noGrp="1"/>
+          </p:cNvSpPr>
+          <p:nvPr>
+            <p:ph type="ftr" sz="quarter" idx="11"/>
+          </p:nvPr>
+        </p:nvSpPr>
+        <p:spPr/>
+        <p:txBody>
+          <a:bodyPr/>
+          <a:lstStyle/>
+          <a:p>
+            <a:endParaRPr lang="en-US"/>
+          </a:p>
+        </p:txBody>
+      </p:sp>
+      <p:sp>
+        <p:nvSpPr>
+          <p:cNvPr id="12" name="Slide Number Placeholder 11"/>
+          <p:cNvSpPr>
+            <a:spLocks noGrp="1"/>
+          </p:cNvSpPr>
+          <p:nvPr>
+            <p:ph type="sldNum" sz="quarter" idx="12"/>
+          </p:nvPr>
+        </p:nvSpPr>
+        <p:spPr/>
+        <p:txBody>
+          <a:bodyPr/>
+          <a:lstStyle/>
+          <a:p>
+            <a:fld id="{C1FF6DA9-008F-8B48-92A6-B652298478BF}" type="slidenum">
+              <a:rPr lang="en-US" smtClean="0"/>
+              <a:t>‹#›</a:t>
+            </a:fld>
+            <a:endParaRPr lang="en-US"/>
+          </a:p>
+        </p:txBody>
+      </p:sp>
+    </p:spTree>
+    <p:extLst>
+      <p:ext uri="{BB962C8B-B14F-4D97-AF65-F5344CB8AC3E}">
+        <p14:creationId xmlns:p14="http://schemas.microsoft.com/office/powerpoint/2010/main" val="271152589"/>
+      </p:ext>
+    </p:extLst>
+  </p:cSld>
+  <p:clrMapOvr>
+    <a:masterClrMapping/>
+  </p:clrMapOvr>
+</p:sldLayout>
+</file>
+
+<file path=ppt/slideLayouts/slideLayout6.xml><?xml version="1.0" encoding="utf-8"?>
+<p:sldLayout xmlns:a="http://schemas.openxmlformats.org/drawingml/2006/main" xmlns:r="http://schemas.openxmlformats.org/officeDocument/2006/relationships" xmlns:p="http://schemas.openxmlformats.org/presentationml/2006/main" type="titleOnly" preserve="1">
+  <p:cSld name="Title Only">
+    <p:spTree>
+      <p:nvGrpSpPr>
+        <p:cNvPr id="1" name=""/>
+        <p:cNvGrpSpPr/>
+        <p:nvPr/>
+      </p:nvGrpSpPr>
+      <p:grpSpPr>
+        <a:xfrm>
+          <a:off x="0" y="0"/>
+          <a:ext cx="0" cy="0"/>
+          <a:chOff x="0" y="0"/>
+          <a:chExt cx="0" cy="0"/>
+        </a:xfrm>
+      </p:grpSpPr>
+      <p:sp>
+        <p:nvSpPr>
+          <p:cNvPr id="6" name="Title 5"/>
+          <p:cNvSpPr>
+            <a:spLocks noGrp="1"/>
+          </p:cNvSpPr>
+          <p:nvPr>
+            <p:ph type="title"/>
+          </p:nvPr>
+        </p:nvSpPr>
+        <p:spPr/>
+        <p:txBody>
+          <a:bodyPr/>
+          <a:lstStyle/>
+          <a:p>
+            <a:r>
+              <a:rPr lang="en-US"/>
+              <a:t>Click to edit Master title style</a:t>
+            </a:r>
+            <a:endParaRPr lang="en-US" dirty="0"/>
+          </a:p>
+        </p:txBody>
+      </p:sp>
+      <p:sp>
+        <p:nvSpPr>
+          <p:cNvPr id="2" name="Date Placeholder 1"/>
+          <p:cNvSpPr>
+            <a:spLocks noGrp="1"/>
+          </p:cNvSpPr>
+          <p:nvPr>
+            <p:ph type="dt" sz="half" idx="10"/>
+          </p:nvPr>
+        </p:nvSpPr>
+        <p:spPr/>
+        <p:txBody>
+          <a:bodyPr/>
+          <a:lstStyle/>
+          <a:p>
+            <a:fld id="{5BCAD085-E8A6-8845-BD4E-CB4CCA059FC4}" type="datetimeFigureOut">
+              <a:rPr lang="en-US" smtClean="0"/>
+              <a:t>11/27/2025</a:t>
+            </a:fld>
+            <a:endParaRPr lang="en-US"/>
+          </a:p>
+        </p:txBody>
+      </p:sp>
+      <p:sp>
+        <p:nvSpPr>
+          <p:cNvPr id="7" name="Footer Placeholder 6"/>
+          <p:cNvSpPr>
+            <a:spLocks noGrp="1"/>
+          </p:cNvSpPr>
+          <p:nvPr>
+            <p:ph type="ftr" sz="quarter" idx="11"/>
+          </p:nvPr>
+        </p:nvSpPr>
+        <p:spPr/>
+        <p:txBody>
+          <a:bodyPr/>
+          <a:lstStyle/>
+          <a:p>
+            <a:endParaRPr lang="en-US"/>
+          </a:p>
+        </p:txBody>
+      </p:sp>
+      <p:sp>
+        <p:nvSpPr>
+          <p:cNvPr id="8" name="Slide Number Placeholder 7"/>
+          <p:cNvSpPr>
+            <a:spLocks noGrp="1"/>
+          </p:cNvSpPr>
+          <p:nvPr>
+            <p:ph type="sldNum" sz="quarter" idx="12"/>
+          </p:nvPr>
+        </p:nvSpPr>
+        <p:spPr/>
+        <p:txBody>
+          <a:bodyPr/>
+          <a:lstStyle/>
+          <a:p>
+            <a:fld id="{C1FF6DA9-008F-8B48-92A6-B652298478BF}" type="slidenum">
+              <a:rPr lang="en-US" smtClean="0"/>
+              <a:t>‹#›</a:t>
+            </a:fld>
+            <a:endParaRPr lang="en-US"/>
+          </a:p>
+        </p:txBody>
+      </p:sp>
+    </p:spTree>
+    <p:extLst>
+      <p:ext uri="{BB962C8B-B14F-4D97-AF65-F5344CB8AC3E}">
+        <p14:creationId xmlns:p14="http://schemas.microsoft.com/office/powerpoint/2010/main" val="2554931105"/>
+      </p:ext>
+    </p:extLst>
+  </p:cSld>
+  <p:clrMapOvr>
+    <a:masterClrMapping/>
+  </p:clrMapOvr>
+</p:sldLayout>
+</file>
+
+<file path=ppt/slideLayouts/slideLayout7.xml><?xml version="1.0" encoding="utf-8"?>
+<p:sldLayout xmlns:a="http://schemas.openxmlformats.org/drawingml/2006/main" xmlns:r="http://schemas.openxmlformats.org/officeDocument/2006/relationships" xmlns:p="http://schemas.openxmlformats.org/presentationml/2006/main" showMasterSp="0" type="blank" preserve="1">
+  <p:cSld name="Blank">
+    <p:spTree>
+      <p:nvGrpSpPr>
+        <p:cNvPr id="1" name=""/>
+        <p:cNvGrpSpPr/>
+        <p:nvPr/>
+      </p:nvGrpSpPr>
+      <p:grpSpPr>
+        <a:xfrm>
+          <a:off x="0" y="0"/>
+          <a:ext cx="0" cy="0"/>
+          <a:chOff x="0" y="0"/>
+          <a:chExt cx="0" cy="0"/>
+        </a:xfrm>
+      </p:grpSpPr>
+      <p:sp>
+        <p:nvSpPr>
+          <p:cNvPr id="5" name="Date Placeholder 4"/>
+          <p:cNvSpPr>
+            <a:spLocks noGrp="1"/>
+          </p:cNvSpPr>
+          <p:nvPr>
+            <p:ph type="dt" sz="half" idx="10"/>
+          </p:nvPr>
+        </p:nvSpPr>
+        <p:spPr/>
+        <p:txBody>
+          <a:bodyPr/>
+          <a:lstStyle/>
+          <a:p>
+            <a:fld id="{5BCAD085-E8A6-8845-BD4E-CB4CCA059FC4}" type="datetimeFigureOut">
+              <a:rPr lang="en-US" smtClean="0"/>
+              <a:t>11/27/2025</a:t>
+            </a:fld>
+            <a:endParaRPr lang="en-US"/>
+          </a:p>
+        </p:txBody>
+      </p:sp>
+      <p:sp>
+        <p:nvSpPr>
+          <p:cNvPr id="6" name="Footer Placeholder 5"/>
+          <p:cNvSpPr>
+            <a:spLocks noGrp="1"/>
+          </p:cNvSpPr>
+          <p:nvPr>
+            <p:ph type="ftr" sz="quarter" idx="11"/>
+          </p:nvPr>
+        </p:nvSpPr>
+        <p:spPr/>
+        <p:txBody>
+          <a:bodyPr/>
+          <a:lstStyle/>
+          <a:p>
+            <a:endParaRPr lang="en-US"/>
+          </a:p>
+        </p:txBody>
+      </p:sp>
+      <p:sp>
+        <p:nvSpPr>
+          <p:cNvPr id="7" name="Slide Number Placeholder 6"/>
+          <p:cNvSpPr>
+            <a:spLocks noGrp="1"/>
+          </p:cNvSpPr>
+          <p:nvPr>
+            <p:ph type="sldNum" sz="quarter" idx="12"/>
+          </p:nvPr>
+        </p:nvSpPr>
+        <p:spPr/>
+        <p:txBody>
+          <a:bodyPr/>
+          <a:lstStyle/>
+          <a:p>
+            <a:fld id="{C1FF6DA9-008F-8B48-92A6-B652298478BF}" type="slidenum">
+              <a:rPr lang="en-US" smtClean="0"/>
+              <a:t>‹#›</a:t>
+            </a:fld>
+            <a:endParaRPr lang="en-US"/>
+          </a:p>
+        </p:txBody>
+      </p:sp>
+    </p:spTree>
+    <p:extLst>
+      <p:ext uri="{BB962C8B-B14F-4D97-AF65-F5344CB8AC3E}">
+        <p14:creationId xmlns:p14="http://schemas.microsoft.com/office/powerpoint/2010/main" val="3001546840"/>
+      </p:ext>
+    </p:extLst>
+  </p:cSld>
+  <p:clrMapOvr>
+    <a:masterClrMapping/>
+  </p:clrMapOvr>
+</p:sldLayout>
+</file>
+
+<file path=ppt/slideLayouts/slideLayout8.xml><?xml version="1.0" encoding="utf-8"?>
+<p:sldLayout xmlns:a="http://schemas.openxmlformats.org/drawingml/2006/main" xmlns:r="http://schemas.openxmlformats.org/officeDocument/2006/relationships" xmlns:p="http://schemas.openxmlformats.org/presentationml/2006/main" type="objTx" preserve="1">
+  <p:cSld name="Content with Caption">
+    <p:spTree>
+      <p:nvGrpSpPr>
+        <p:cNvPr id="1" name=""/>
+        <p:cNvGrpSpPr/>
+        <p:nvPr/>
+      </p:nvGrpSpPr>
+      <p:grpSpPr>
+        <a:xfrm>
+          <a:off x="0" y="0"/>
+          <a:ext cx="0" cy="0"/>
+          <a:chOff x="0" y="0"/>
+          <a:chExt cx="0" cy="0"/>
+        </a:xfrm>
+      </p:grpSpPr>
+      <p:sp>
+        <p:nvSpPr>
+          <p:cNvPr id="2" name="Title 1"/>
+          <p:cNvSpPr>
+            <a:spLocks noGrp="1"/>
+          </p:cNvSpPr>
+          <p:nvPr>
+            <p:ph type="title"/>
+          </p:nvPr>
+        </p:nvSpPr>
+        <p:spPr>
+          <a:xfrm>
+            <a:off x="192024" y="1143000"/>
+            <a:ext cx="2125980" cy="2194560"/>
+          </a:xfrm>
+        </p:spPr>
+        <p:txBody>
+          <a:bodyPr anchor="b">
+            <a:normAutofit/>
+          </a:bodyPr>
+          <a:lstStyle>
+            <a:lvl1pPr>
+              <a:defRPr sz="2800" b="0" baseline="0"/>
+            </a:lvl1pPr>
+          </a:lstStyle>
+          <a:p>
+            <a:r>
+              <a:rPr lang="en-US"/>
+              <a:t>Click to edit Master title style</a:t>
+            </a:r>
+            <a:endParaRPr lang="en-US" dirty="0"/>
+          </a:p>
+        </p:txBody>
+      </p:sp>
+      <p:sp>
+        <p:nvSpPr>
+          <p:cNvPr id="3" name="Content Placeholder 2"/>
+          <p:cNvSpPr>
+            <a:spLocks noGrp="1"/>
+          </p:cNvSpPr>
+          <p:nvPr>
+            <p:ph idx="1"/>
+          </p:nvPr>
+        </p:nvSpPr>
+        <p:spPr>
+          <a:xfrm>
+            <a:off x="2900934" y="868680"/>
+            <a:ext cx="5486400" cy="5120640"/>
+          </a:xfrm>
+        </p:spPr>
+        <p:txBody>
+          <a:bodyPr/>
+          <a:lstStyle>
+            <a:lvl1pPr>
+              <a:defRPr sz="2000"/>
             </a:lvl1pPr>
             <a:lvl2pPr>
               <a:defRPr sz="1800"/>
@@ -2382,475 +2819,6 @@
       </p:sp>
       <p:sp>
         <p:nvSpPr>
-          <p:cNvPr id="7" name="Date Placeholder 6"/>
-          <p:cNvSpPr>
-            <a:spLocks noGrp="1"/>
-          </p:cNvSpPr>
-          <p:nvPr>
-            <p:ph type="dt" sz="half" idx="10"/>
-          </p:nvPr>
-        </p:nvSpPr>
-        <p:spPr/>
-        <p:txBody>
-          <a:bodyPr/>
-          <a:lstStyle/>
-          <a:p>
-            <a:fld id="{5BCAD085-E8A6-8845-BD4E-CB4CCA059FC4}" type="datetimeFigureOut">
-              <a:rPr lang="en-US" smtClean="0"/>
-              <a:t>11/27/2025</a:t>
-            </a:fld>
-            <a:endParaRPr lang="en-US"/>
-          </a:p>
-        </p:txBody>
-      </p:sp>
-      <p:sp>
-        <p:nvSpPr>
-          <p:cNvPr id="8" name="Footer Placeholder 7"/>
-          <p:cNvSpPr>
-            <a:spLocks noGrp="1"/>
-          </p:cNvSpPr>
-          <p:nvPr>
-            <p:ph type="ftr" sz="quarter" idx="11"/>
-          </p:nvPr>
-        </p:nvSpPr>
-        <p:spPr/>
-        <p:txBody>
-          <a:bodyPr/>
-          <a:lstStyle/>
-          <a:p>
-            <a:endParaRPr lang="en-US"/>
-          </a:p>
-        </p:txBody>
-      </p:sp>
-      <p:sp>
-        <p:nvSpPr>
-          <p:cNvPr id="9" name="Slide Number Placeholder 8"/>
-          <p:cNvSpPr>
-            <a:spLocks noGrp="1"/>
-          </p:cNvSpPr>
-          <p:nvPr>
-            <p:ph type="sldNum" sz="quarter" idx="12"/>
-          </p:nvPr>
-        </p:nvSpPr>
-        <p:spPr/>
-        <p:txBody>
-          <a:bodyPr/>
-          <a:lstStyle/>
-          <a:p>
-            <a:fld id="{C1FF6DA9-008F-8B48-92A6-B652298478BF}" type="slidenum">
-              <a:rPr lang="en-US" smtClean="0"/>
-              <a:t>‹#›</a:t>
-            </a:fld>
-            <a:endParaRPr lang="en-US"/>
-          </a:p>
-        </p:txBody>
-      </p:sp>
-    </p:spTree>
-    <p:extLst>
-      <p:ext uri="{BB962C8B-B14F-4D97-AF65-F5344CB8AC3E}">
-        <p14:creationId xmlns:p14="http://schemas.microsoft.com/office/powerpoint/2010/main" val="2869569505"/>
-      </p:ext>
-    </p:extLst>
-  </p:cSld>
-  <p:clrMapOvr>
-    <a:masterClrMapping/>
-  </p:clrMapOvr>
-</p:sldLayout>
-</file>
-
-<file path=ppt/slideLayouts/slideLayout6.xml><?xml version="1.0" encoding="utf-8"?>
-<p:sldLayout xmlns:a="http://schemas.openxmlformats.org/drawingml/2006/main" xmlns:r="http://schemas.openxmlformats.org/officeDocument/2006/relationships" xmlns:p="http://schemas.openxmlformats.org/presentationml/2006/main" type="titleOnly" preserve="1">
-  <p:cSld name="Title Only">
-    <p:spTree>
-      <p:nvGrpSpPr>
-        <p:cNvPr id="1" name=""/>
-        <p:cNvGrpSpPr/>
-        <p:nvPr/>
-      </p:nvGrpSpPr>
-      <p:grpSpPr>
-        <a:xfrm>
-          <a:off x="0" y="0"/>
-          <a:ext cx="0" cy="0"/>
-          <a:chOff x="0" y="0"/>
-          <a:chExt cx="0" cy="0"/>
-        </a:xfrm>
-      </p:grpSpPr>
-      <p:sp>
-        <p:nvSpPr>
-          <p:cNvPr id="6" name="Title 5"/>
-          <p:cNvSpPr>
-            <a:spLocks noGrp="1"/>
-          </p:cNvSpPr>
-          <p:nvPr>
-            <p:ph type="title"/>
-          </p:nvPr>
-        </p:nvSpPr>
-        <p:spPr/>
-        <p:txBody>
-          <a:bodyPr/>
-          <a:lstStyle/>
-          <a:p>
-            <a:r>
-              <a:rPr lang="en-US"/>
-              <a:t>Click to edit Master title style</a:t>
-            </a:r>
-            <a:endParaRPr lang="en-US" dirty="0"/>
-          </a:p>
-        </p:txBody>
-      </p:sp>
-      <p:sp>
-        <p:nvSpPr>
-          <p:cNvPr id="3" name="Date Placeholder 2"/>
-          <p:cNvSpPr>
-            <a:spLocks noGrp="1"/>
-          </p:cNvSpPr>
-          <p:nvPr>
-            <p:ph type="dt" sz="half" idx="10"/>
-          </p:nvPr>
-        </p:nvSpPr>
-        <p:spPr/>
-        <p:txBody>
-          <a:bodyPr/>
-          <a:lstStyle/>
-          <a:p>
-            <a:fld id="{5BCAD085-E8A6-8845-BD4E-CB4CCA059FC4}" type="datetimeFigureOut">
-              <a:rPr lang="en-US" smtClean="0"/>
-              <a:t>11/27/2025</a:t>
-            </a:fld>
-            <a:endParaRPr lang="en-US"/>
-          </a:p>
-        </p:txBody>
-      </p:sp>
-      <p:sp>
-        <p:nvSpPr>
-          <p:cNvPr id="4" name="Footer Placeholder 3"/>
-          <p:cNvSpPr>
-            <a:spLocks noGrp="1"/>
-          </p:cNvSpPr>
-          <p:nvPr>
-            <p:ph type="ftr" sz="quarter" idx="11"/>
-          </p:nvPr>
-        </p:nvSpPr>
-        <p:spPr/>
-        <p:txBody>
-          <a:bodyPr/>
-          <a:lstStyle/>
-          <a:p>
-            <a:endParaRPr lang="en-US"/>
-          </a:p>
-        </p:txBody>
-      </p:sp>
-      <p:sp>
-        <p:nvSpPr>
-          <p:cNvPr id="5" name="Slide Number Placeholder 4"/>
-          <p:cNvSpPr>
-            <a:spLocks noGrp="1"/>
-          </p:cNvSpPr>
-          <p:nvPr>
-            <p:ph type="sldNum" sz="quarter" idx="12"/>
-          </p:nvPr>
-        </p:nvSpPr>
-        <p:spPr/>
-        <p:txBody>
-          <a:bodyPr/>
-          <a:lstStyle/>
-          <a:p>
-            <a:fld id="{C1FF6DA9-008F-8B48-92A6-B652298478BF}" type="slidenum">
-              <a:rPr lang="en-US" smtClean="0"/>
-              <a:t>‹#›</a:t>
-            </a:fld>
-            <a:endParaRPr lang="en-US"/>
-          </a:p>
-        </p:txBody>
-      </p:sp>
-    </p:spTree>
-    <p:extLst>
-      <p:ext uri="{BB962C8B-B14F-4D97-AF65-F5344CB8AC3E}">
-        <p14:creationId xmlns:p14="http://schemas.microsoft.com/office/powerpoint/2010/main" val="3866639810"/>
-      </p:ext>
-    </p:extLst>
-  </p:cSld>
-  <p:clrMapOvr>
-    <a:masterClrMapping/>
-  </p:clrMapOvr>
-</p:sldLayout>
-</file>
-
-<file path=ppt/slideLayouts/slideLayout7.xml><?xml version="1.0" encoding="utf-8"?>
-<p:sldLayout xmlns:a="http://schemas.openxmlformats.org/drawingml/2006/main" xmlns:r="http://schemas.openxmlformats.org/officeDocument/2006/relationships" xmlns:p="http://schemas.openxmlformats.org/presentationml/2006/main" type="blank" preserve="1">
-  <p:cSld name="Blank">
-    <p:spTree>
-      <p:nvGrpSpPr>
-        <p:cNvPr id="1" name=""/>
-        <p:cNvGrpSpPr/>
-        <p:nvPr/>
-      </p:nvGrpSpPr>
-      <p:grpSpPr>
-        <a:xfrm>
-          <a:off x="0" y="0"/>
-          <a:ext cx="0" cy="0"/>
-          <a:chOff x="0" y="0"/>
-          <a:chExt cx="0" cy="0"/>
-        </a:xfrm>
-      </p:grpSpPr>
-      <p:sp>
-        <p:nvSpPr>
-          <p:cNvPr id="2" name="Date Placeholder 1"/>
-          <p:cNvSpPr>
-            <a:spLocks noGrp="1"/>
-          </p:cNvSpPr>
-          <p:nvPr>
-            <p:ph type="dt" sz="half" idx="10"/>
-          </p:nvPr>
-        </p:nvSpPr>
-        <p:spPr/>
-        <p:txBody>
-          <a:bodyPr/>
-          <a:lstStyle/>
-          <a:p>
-            <a:fld id="{5BCAD085-E8A6-8845-BD4E-CB4CCA059FC4}" type="datetimeFigureOut">
-              <a:rPr lang="en-US" smtClean="0"/>
-              <a:t>11/27/2025</a:t>
-            </a:fld>
-            <a:endParaRPr lang="en-US"/>
-          </a:p>
-        </p:txBody>
-      </p:sp>
-      <p:sp>
-        <p:nvSpPr>
-          <p:cNvPr id="3" name="Footer Placeholder 2"/>
-          <p:cNvSpPr>
-            <a:spLocks noGrp="1"/>
-          </p:cNvSpPr>
-          <p:nvPr>
-            <p:ph type="ftr" sz="quarter" idx="11"/>
-          </p:nvPr>
-        </p:nvSpPr>
-        <p:spPr/>
-        <p:txBody>
-          <a:bodyPr/>
-          <a:lstStyle/>
-          <a:p>
-            <a:endParaRPr lang="en-US"/>
-          </a:p>
-        </p:txBody>
-      </p:sp>
-      <p:sp>
-        <p:nvSpPr>
-          <p:cNvPr id="4" name="Slide Number Placeholder 3"/>
-          <p:cNvSpPr>
-            <a:spLocks noGrp="1"/>
-          </p:cNvSpPr>
-          <p:nvPr>
-            <p:ph type="sldNum" sz="quarter" idx="12"/>
-          </p:nvPr>
-        </p:nvSpPr>
-        <p:spPr/>
-        <p:txBody>
-          <a:bodyPr/>
-          <a:lstStyle/>
-          <a:p>
-            <a:fld id="{C1FF6DA9-008F-8B48-92A6-B652298478BF}" type="slidenum">
-              <a:rPr lang="en-US" smtClean="0"/>
-              <a:t>‹#›</a:t>
-            </a:fld>
-            <a:endParaRPr lang="en-US"/>
-          </a:p>
-        </p:txBody>
-      </p:sp>
-    </p:spTree>
-    <p:extLst>
-      <p:ext uri="{BB962C8B-B14F-4D97-AF65-F5344CB8AC3E}">
-        <p14:creationId xmlns:p14="http://schemas.microsoft.com/office/powerpoint/2010/main" val="646657729"/>
-      </p:ext>
-    </p:extLst>
-  </p:cSld>
-  <p:clrMapOvr>
-    <a:masterClrMapping/>
-  </p:clrMapOvr>
-</p:sldLayout>
-</file>
-
-<file path=ppt/slideLayouts/slideLayout8.xml><?xml version="1.0" encoding="utf-8"?>
-<p:sldLayout xmlns:a="http://schemas.openxmlformats.org/drawingml/2006/main" xmlns:r="http://schemas.openxmlformats.org/officeDocument/2006/relationships" xmlns:p="http://schemas.openxmlformats.org/presentationml/2006/main" type="objTx" preserve="1">
-  <p:cSld name="Content with Caption">
-    <p:spTree>
-      <p:nvGrpSpPr>
-        <p:cNvPr id="1" name=""/>
-        <p:cNvGrpSpPr/>
-        <p:nvPr/>
-      </p:nvGrpSpPr>
-      <p:grpSpPr>
-        <a:xfrm>
-          <a:off x="0" y="0"/>
-          <a:ext cx="0" cy="0"/>
-          <a:chOff x="0" y="0"/>
-          <a:chExt cx="0" cy="0"/>
-        </a:xfrm>
-      </p:grpSpPr>
-      <p:sp>
-        <p:nvSpPr>
-          <p:cNvPr id="2" name="Rectangle 1"/>
-          <p:cNvSpPr/>
-          <p:nvPr/>
-        </p:nvSpPr>
-        <p:spPr>
-          <a:xfrm>
-            <a:off x="5715000" y="0"/>
-            <a:ext cx="3429000" cy="6858000"/>
-          </a:xfrm>
-          <a:prstGeom prst="rect">
-            <a:avLst/>
-          </a:prstGeom>
-          <a:ln>
-            <a:noFill/>
-          </a:ln>
-        </p:spPr>
-        <p:style>
-          <a:lnRef idx="2">
-            <a:schemeClr val="accent1">
-              <a:shade val="50000"/>
-            </a:schemeClr>
-          </a:lnRef>
-          <a:fillRef idx="1">
-            <a:schemeClr val="accent1"/>
-          </a:fillRef>
-          <a:effectRef idx="0">
-            <a:schemeClr val="accent1"/>
-          </a:effectRef>
-          <a:fontRef idx="minor">
-            <a:schemeClr val="lt1"/>
-          </a:fontRef>
-        </p:style>
-      </p:sp>
-      <p:sp>
-        <p:nvSpPr>
-          <p:cNvPr id="9" name="Title 8"/>
-          <p:cNvSpPr>
-            <a:spLocks noGrp="1"/>
-          </p:cNvSpPr>
-          <p:nvPr>
-            <p:ph type="title"/>
-          </p:nvPr>
-        </p:nvSpPr>
-        <p:spPr>
-          <a:xfrm>
-            <a:off x="6196053" y="542282"/>
-            <a:ext cx="2537460" cy="1920240"/>
-          </a:xfrm>
-        </p:spPr>
-        <p:txBody>
-          <a:bodyPr anchor="b">
-            <a:noAutofit/>
-          </a:bodyPr>
-          <a:lstStyle>
-            <a:lvl1pPr>
-              <a:lnSpc>
-                <a:spcPct val="85000"/>
-              </a:lnSpc>
-              <a:defRPr sz="3600">
-                <a:solidFill>
-                  <a:srgbClr val="FFFFFF"/>
-                </a:solidFill>
-              </a:defRPr>
-            </a:lvl1pPr>
-          </a:lstStyle>
-          <a:p>
-            <a:r>
-              <a:rPr lang="en-US"/>
-              <a:t>Click to edit Master title style</a:t>
-            </a:r>
-            <a:endParaRPr lang="en-US" dirty="0"/>
-          </a:p>
-        </p:txBody>
-      </p:sp>
-      <p:sp>
-        <p:nvSpPr>
-          <p:cNvPr id="3" name="Content Placeholder 2"/>
-          <p:cNvSpPr>
-            <a:spLocks noGrp="1"/>
-          </p:cNvSpPr>
-          <p:nvPr>
-            <p:ph idx="1"/>
-          </p:nvPr>
-        </p:nvSpPr>
-        <p:spPr>
-          <a:xfrm>
-            <a:off x="571500" y="762000"/>
-            <a:ext cx="4572000" cy="4572000"/>
-          </a:xfrm>
-        </p:spPr>
-        <p:txBody>
-          <a:bodyPr/>
-          <a:lstStyle>
-            <a:lvl1pPr>
-              <a:defRPr sz="2200"/>
-            </a:lvl1pPr>
-            <a:lvl2pPr>
-              <a:defRPr sz="1900"/>
-            </a:lvl2pPr>
-            <a:lvl3pPr>
-              <a:defRPr sz="1700"/>
-            </a:lvl3pPr>
-            <a:lvl4pPr>
-              <a:defRPr sz="1500"/>
-            </a:lvl4pPr>
-            <a:lvl5pPr>
-              <a:defRPr sz="1400"/>
-            </a:lvl5pPr>
-            <a:lvl6pPr>
-              <a:defRPr sz="1400"/>
-            </a:lvl6pPr>
-            <a:lvl7pPr>
-              <a:defRPr sz="1400"/>
-            </a:lvl7pPr>
-            <a:lvl8pPr>
-              <a:defRPr sz="1400"/>
-            </a:lvl8pPr>
-            <a:lvl9pPr>
-              <a:defRPr sz="1400"/>
-            </a:lvl9pPr>
-          </a:lstStyle>
-          <a:p>
-            <a:pPr lvl="0"/>
-            <a:r>
-              <a:rPr lang="en-US"/>
-              <a:t>Click to edit Master text styles</a:t>
-            </a:r>
-          </a:p>
-          <a:p>
-            <a:pPr lvl="1"/>
-            <a:r>
-              <a:rPr lang="en-US"/>
-              <a:t>Second level</a:t>
-            </a:r>
-          </a:p>
-          <a:p>
-            <a:pPr lvl="2"/>
-            <a:r>
-              <a:rPr lang="en-US"/>
-              <a:t>Third level</a:t>
-            </a:r>
-          </a:p>
-          <a:p>
-            <a:pPr lvl="3"/>
-            <a:r>
-              <a:rPr lang="en-US"/>
-              <a:t>Fourth level</a:t>
-            </a:r>
-          </a:p>
-          <a:p>
-            <a:pPr lvl="4"/>
-            <a:r>
-              <a:rPr lang="en-US"/>
-              <a:t>Fifth level</a:t>
-            </a:r>
-            <a:endParaRPr lang="en-US" dirty="0"/>
-          </a:p>
-        </p:txBody>
-      </p:sp>
-      <p:sp>
-        <p:nvSpPr>
           <p:cNvPr id="4" name="Text Placeholder 3"/>
           <p:cNvSpPr>
             <a:spLocks noGrp="1"/>
@@ -2861,33 +2829,26 @@
         </p:nvSpPr>
         <p:spPr>
           <a:xfrm>
-            <a:off x="6206987" y="2511813"/>
-            <a:ext cx="2548890" cy="3126987"/>
-          </a:xfrm>
-        </p:spPr>
-        <p:txBody>
-          <a:bodyPr>
+            <a:off x="192024" y="3337560"/>
+            <a:ext cx="2125980" cy="2560320"/>
+          </a:xfrm>
+        </p:spPr>
+        <p:txBody>
+          <a:bodyPr anchor="t">
             <a:normAutofit/>
           </a:bodyPr>
           <a:lstStyle>
-            <a:lvl1pPr marL="0" marR="0" indent="0" algn="l" defTabSz="914400" rtl="0" eaLnBrk="1" fontAlgn="auto" latinLnBrk="0" hangingPunct="1">
+            <a:lvl1pPr marL="0" indent="0">
               <a:lnSpc>
                 <a:spcPct val="100000"/>
               </a:lnSpc>
               <a:spcBef>
-                <a:spcPts val="1200"/>
+                <a:spcPts val="800"/>
               </a:spcBef>
-              <a:spcAft>
-                <a:spcPts val="0"/>
-              </a:spcAft>
-              <a:buClrTx/>
-              <a:buSzTx/>
-              <a:buFontTx/>
               <a:buNone/>
-              <a:tabLst/>
-              <a:defRPr sz="1500">
-                <a:solidFill>
-                  <a:srgbClr val="404040"/>
+              <a:defRPr sz="1250">
+                <a:solidFill>
+                  <a:srgbClr val="FFFFFF"/>
                 </a:solidFill>
               </a:defRPr>
             </a:lvl1pPr>
@@ -2925,23 +2886,7 @@
             </a:lvl9pPr>
           </a:lstStyle>
           <a:p>
-            <a:pPr marL="0" marR="0" lvl="0" indent="0" algn="l" defTabSz="914400" rtl="0" eaLnBrk="1" fontAlgn="auto" latinLnBrk="0" hangingPunct="1">
-              <a:lnSpc>
-                <a:spcPct val="100000"/>
-              </a:lnSpc>
-              <a:spcBef>
-                <a:spcPts val="1400"/>
-              </a:spcBef>
-              <a:spcAft>
-                <a:spcPts val="0"/>
-              </a:spcAft>
-              <a:buClrTx/>
-              <a:buSzTx/>
-              <a:buFontTx/>
-              <a:buNone/>
-              <a:tabLst/>
-              <a:defRPr/>
-            </a:pPr>
+            <a:pPr lvl="0"/>
             <a:r>
               <a:rPr lang="en-US"/>
               <a:t>Click to edit Master text styles</a:t>
@@ -2951,7 +2896,7 @@
       </p:sp>
       <p:sp>
         <p:nvSpPr>
-          <p:cNvPr id="5" name="Date Placeholder 4"/>
+          <p:cNvPr id="8" name="Date Placeholder 7"/>
           <p:cNvSpPr>
             <a:spLocks noGrp="1"/>
           </p:cNvSpPr>
@@ -2974,7 +2919,7 @@
       </p:sp>
       <p:sp>
         <p:nvSpPr>
-          <p:cNvPr id="6" name="Footer Placeholder 5"/>
+          <p:cNvPr id="9" name="Footer Placeholder 8"/>
           <p:cNvSpPr>
             <a:spLocks noGrp="1"/>
           </p:cNvSpPr>
@@ -2993,7 +2938,7 @@
       </p:sp>
       <p:sp>
         <p:nvSpPr>
-          <p:cNvPr id="7" name="Slide Number Placeholder 6"/>
+          <p:cNvPr id="10" name="Slide Number Placeholder 9"/>
           <p:cNvSpPr>
             <a:spLocks noGrp="1"/>
           </p:cNvSpPr>
@@ -3004,17 +2949,7 @@
         <p:spPr/>
         <p:txBody>
           <a:bodyPr/>
-          <a:lstStyle>
-            <a:lvl1pPr>
-              <a:defRPr>
-                <a:solidFill>
-                  <a:srgbClr val="FFFFFF">
-                    <a:alpha val="20000"/>
-                  </a:srgbClr>
-                </a:solidFill>
-              </a:defRPr>
-            </a:lvl1pPr>
-          </a:lstStyle>
+          <a:lstStyle/>
           <a:p>
             <a:fld id="{C1FF6DA9-008F-8B48-92A6-B652298478BF}" type="slidenum">
               <a:rPr lang="en-US" smtClean="0"/>
@@ -3027,7 +2962,7 @@
     </p:spTree>
     <p:extLst>
       <p:ext uri="{BB962C8B-B14F-4D97-AF65-F5344CB8AC3E}">
-        <p14:creationId xmlns:p14="http://schemas.microsoft.com/office/powerpoint/2010/main" val="773647111"/>
+        <p14:creationId xmlns:p14="http://schemas.microsoft.com/office/powerpoint/2010/main" val="2620759587"/>
       </p:ext>
     </p:extLst>
   </p:cSld>
@@ -3040,14 +2975,6 @@
 <file path=ppt/slideLayouts/slideLayout9.xml><?xml version="1.0" encoding="utf-8"?>
 <p:sldLayout xmlns:a="http://schemas.openxmlformats.org/drawingml/2006/main" xmlns:r="http://schemas.openxmlformats.org/officeDocument/2006/relationships" xmlns:p="http://schemas.openxmlformats.org/presentationml/2006/main" type="picTx" preserve="1">
   <p:cSld name="Picture with Caption">
-    <p:bg>
-      <p:bgPr>
-        <a:solidFill>
-          <a:schemeClr val="accent1"/>
-        </a:solidFill>
-        <a:effectLst/>
-      </p:bgPr>
-    </p:bg>
     <p:spTree>
       <p:nvGrpSpPr>
         <p:cNvPr id="1" name=""/>
@@ -3074,8 +3001,8 @@
         </p:nvSpPr>
         <p:spPr>
           <a:xfrm>
-            <a:off x="486918" y="5418668"/>
-            <a:ext cx="8085582" cy="613283"/>
+            <a:off x="192024" y="1143000"/>
+            <a:ext cx="2125980" cy="2194560"/>
           </a:xfrm>
         </p:spPr>
         <p:txBody>
@@ -3084,14 +3011,7 @@
           </a:bodyPr>
           <a:lstStyle>
             <a:lvl1pPr>
-              <a:lnSpc>
-                <a:spcPct val="85000"/>
-              </a:lnSpc>
-              <a:defRPr sz="2800" b="0">
-                <a:solidFill>
-                  <a:srgbClr val="FFFFFF"/>
-                </a:solidFill>
-              </a:defRPr>
+              <a:defRPr sz="2800" b="0"/>
             </a:lvl1pPr>
           </a:lstStyle>
           <a:p>
@@ -3115,29 +3035,21 @@
         </p:nvSpPr>
         <p:spPr>
           <a:xfrm>
-            <a:off x="0" y="0"/>
-            <a:ext cx="9144000" cy="5330952"/>
+            <a:off x="2677983" y="767419"/>
+            <a:ext cx="6086423" cy="5330952"/>
           </a:xfrm>
           <a:solidFill>
-            <a:schemeClr val="accent1">
-              <a:lumMod val="20000"/>
-              <a:lumOff val="80000"/>
+            <a:schemeClr val="bg1">
+              <a:lumMod val="75000"/>
             </a:schemeClr>
           </a:solidFill>
         </p:spPr>
         <p:txBody>
           <a:bodyPr anchor="t"/>
           <a:lstStyle>
-            <a:lvl1pPr marL="0" indent="0" algn="ctr">
-              <a:spcBef>
-                <a:spcPts val="800"/>
-              </a:spcBef>
+            <a:lvl1pPr marL="0" indent="0">
               <a:buNone/>
-              <a:defRPr sz="3200">
-                <a:solidFill>
-                  <a:srgbClr val="4D4D4D"/>
-                </a:solidFill>
-              </a:defRPr>
+              <a:defRPr sz="3200"/>
             </a:lvl1pPr>
             <a:lvl2pPr marL="457200" indent="0">
               <a:buNone/>
@@ -3193,26 +3105,26 @@
         </p:nvSpPr>
         <p:spPr>
           <a:xfrm>
-            <a:off x="507492" y="5909735"/>
-            <a:ext cx="6922008" cy="533400"/>
-          </a:xfrm>
-        </p:spPr>
-        <p:txBody>
-          <a:bodyPr>
+            <a:off x="192024" y="3340602"/>
+            <a:ext cx="2125980" cy="2560320"/>
+          </a:xfrm>
+        </p:spPr>
+        <p:txBody>
+          <a:bodyPr anchor="t">
             <a:normAutofit/>
           </a:bodyPr>
           <a:lstStyle>
             <a:lvl1pPr marL="0" indent="0">
               <a:lnSpc>
-                <a:spcPct val="90000"/>
+                <a:spcPct val="100000"/>
               </a:lnSpc>
               <a:spcBef>
-                <a:spcPts val="1200"/>
+                <a:spcPts val="800"/>
               </a:spcBef>
               <a:buNone/>
-              <a:defRPr sz="1400">
-                <a:solidFill>
-                  <a:srgbClr val="262626"/>
+              <a:defRPr sz="1250">
+                <a:solidFill>
+                  <a:srgbClr val="FFFFFF"/>
                 </a:solidFill>
               </a:defRPr>
             </a:lvl1pPr>
@@ -3260,7 +3172,7 @@
       </p:sp>
       <p:sp>
         <p:nvSpPr>
-          <p:cNvPr id="5" name="Date Placeholder 4"/>
+          <p:cNvPr id="8" name="Date Placeholder 7"/>
           <p:cNvSpPr>
             <a:spLocks noGrp="1"/>
           </p:cNvSpPr>
@@ -3271,17 +3183,7 @@
         <p:spPr/>
         <p:txBody>
           <a:bodyPr/>
-          <a:lstStyle>
-            <a:lvl1pPr>
-              <a:defRPr>
-                <a:solidFill>
-                  <a:srgbClr val="FFFFFF">
-                    <a:alpha val="75000"/>
-                  </a:srgbClr>
-                </a:solidFill>
-              </a:defRPr>
-            </a:lvl1pPr>
-          </a:lstStyle>
+          <a:lstStyle/>
           <a:p>
             <a:fld id="{5BCAD085-E8A6-8845-BD4E-CB4CCA059FC4}" type="datetimeFigureOut">
               <a:rPr lang="en-US" smtClean="0"/>
@@ -3293,7 +3195,7 @@
       </p:sp>
       <p:sp>
         <p:nvSpPr>
-          <p:cNvPr id="6" name="Footer Placeholder 5"/>
+          <p:cNvPr id="9" name="Footer Placeholder 8"/>
           <p:cNvSpPr>
             <a:spLocks noGrp="1"/>
           </p:cNvSpPr>
@@ -3301,20 +3203,15 @@
             <p:ph type="ftr" sz="quarter" idx="11"/>
           </p:nvPr>
         </p:nvSpPr>
-        <p:spPr/>
+        <p:spPr>
+          <a:xfrm>
+            <a:off x="2624326" y="6356351"/>
+            <a:ext cx="4433638" cy="365125"/>
+          </a:xfrm>
+        </p:spPr>
         <p:txBody>
           <a:bodyPr/>
-          <a:lstStyle>
-            <a:lvl1pPr>
-              <a:defRPr>
-                <a:solidFill>
-                  <a:srgbClr val="FFFFFF">
-                    <a:alpha val="75000"/>
-                  </a:srgbClr>
-                </a:solidFill>
-              </a:defRPr>
-            </a:lvl1pPr>
-          </a:lstStyle>
+          <a:lstStyle/>
           <a:p>
             <a:endParaRPr lang="en-US"/>
           </a:p>
@@ -3322,7 +3219,7 @@
       </p:sp>
       <p:sp>
         <p:nvSpPr>
-          <p:cNvPr id="7" name="Slide Number Placeholder 6"/>
+          <p:cNvPr id="10" name="Slide Number Placeholder 9"/>
           <p:cNvSpPr>
             <a:spLocks noGrp="1"/>
           </p:cNvSpPr>
@@ -3333,17 +3230,7 @@
         <p:spPr/>
         <p:txBody>
           <a:bodyPr/>
-          <a:lstStyle>
-            <a:lvl1pPr>
-              <a:defRPr>
-                <a:solidFill>
-                  <a:srgbClr val="FFFFFF">
-                    <a:alpha val="20000"/>
-                  </a:srgbClr>
-                </a:solidFill>
-              </a:defRPr>
-            </a:lvl1pPr>
-          </a:lstStyle>
+          <a:lstStyle/>
           <a:p>
             <a:fld id="{C1FF6DA9-008F-8B48-92A6-B652298478BF}" type="slidenum">
               <a:rPr lang="en-US" smtClean="0"/>
@@ -3356,12 +3243,12 @@
     </p:spTree>
     <p:extLst>
       <p:ext uri="{BB962C8B-B14F-4D97-AF65-F5344CB8AC3E}">
-        <p14:creationId xmlns:p14="http://schemas.microsoft.com/office/powerpoint/2010/main" val="1276925408"/>
+        <p14:creationId xmlns:p14="http://schemas.microsoft.com/office/powerpoint/2010/main" val="2178060648"/>
       </p:ext>
     </p:extLst>
   </p:cSld>
   <p:clrMapOvr>
-    <a:overrideClrMapping bg1="dk1" tx1="lt1" bg2="dk2" tx2="lt2" accent1="accent1" accent2="accent2" accent3="accent3" accent4="accent4" accent5="accent5" accent6="accent6" hlink="hlink" folHlink="folHlink"/>
+    <a:masterClrMapping/>
   </p:clrMapOvr>
 </p:sldLayout>
 </file>
@@ -3390,6 +3277,44 @@
       </p:grpSpPr>
       <p:sp>
         <p:nvSpPr>
+          <p:cNvPr id="7" name="Rectangle 6"/>
+          <p:cNvSpPr/>
+          <p:nvPr/>
+        </p:nvSpPr>
+        <p:spPr>
+          <a:xfrm>
+            <a:off x="1" y="758952"/>
+            <a:ext cx="2582693" cy="5330952"/>
+          </a:xfrm>
+          <a:prstGeom prst="rect">
+            <a:avLst/>
+          </a:prstGeom>
+          <a:solidFill>
+            <a:schemeClr val="accent1"/>
+          </a:solidFill>
+          <a:ln>
+            <a:noFill/>
+          </a:ln>
+        </p:spPr>
+        <p:style>
+          <a:lnRef idx="2">
+            <a:schemeClr val="accent1">
+              <a:shade val="50000"/>
+            </a:schemeClr>
+          </a:lnRef>
+          <a:fillRef idx="1">
+            <a:schemeClr val="accent1"/>
+          </a:fillRef>
+          <a:effectRef idx="0">
+            <a:schemeClr val="accent1"/>
+          </a:effectRef>
+          <a:fontRef idx="minor">
+            <a:schemeClr val="lt1"/>
+          </a:fontRef>
+        </p:style>
+      </p:sp>
+      <p:sp>
+        <p:nvSpPr>
           <p:cNvPr id="2" name="Title Placeholder 1"/>
           <p:cNvSpPr>
             <a:spLocks noGrp="1"/>
@@ -3400,8 +3325,8 @@
         </p:nvSpPr>
         <p:spPr>
           <a:xfrm>
-            <a:off x="492919" y="499533"/>
-            <a:ext cx="8079581" cy="1658198"/>
+            <a:off x="189689" y="1123838"/>
+            <a:ext cx="2210612" cy="4601183"/>
           </a:xfrm>
           <a:prstGeom prst="rect">
             <a:avLst/>
@@ -3420,6 +3345,46 @@
             <a:endParaRPr lang="en-US" dirty="0"/>
           </a:p>
         </p:txBody>
+      </p:sp>
+      <p:sp>
+        <p:nvSpPr>
+          <p:cNvPr id="38" name="Rectangle 37"/>
+          <p:cNvSpPr/>
+          <p:nvPr/>
+        </p:nvSpPr>
+        <p:spPr>
+          <a:xfrm>
+            <a:off x="8861898" y="758952"/>
+            <a:ext cx="288036" cy="5330952"/>
+          </a:xfrm>
+          <a:prstGeom prst="rect">
+            <a:avLst/>
+          </a:prstGeom>
+          <a:solidFill>
+            <a:srgbClr val="C8C8C8">
+              <a:alpha val="49804"/>
+            </a:srgbClr>
+          </a:solidFill>
+          <a:ln>
+            <a:noFill/>
+          </a:ln>
+        </p:spPr>
+        <p:style>
+          <a:lnRef idx="2">
+            <a:schemeClr val="accent1">
+              <a:shade val="50000"/>
+            </a:schemeClr>
+          </a:lnRef>
+          <a:fillRef idx="1">
+            <a:schemeClr val="accent1"/>
+          </a:fillRef>
+          <a:effectRef idx="0">
+            <a:schemeClr val="accent1"/>
+          </a:effectRef>
+          <a:fontRef idx="minor">
+            <a:schemeClr val="lt1"/>
+          </a:fontRef>
+        </p:style>
       </p:sp>
       <p:sp>
         <p:nvSpPr>
@@ -3433,15 +3398,15 @@
         </p:nvSpPr>
         <p:spPr>
           <a:xfrm>
-            <a:off x="507206" y="1993393"/>
-            <a:ext cx="8065294" cy="3766185"/>
-          </a:xfrm>
-          <a:prstGeom prst="rect">
-            <a:avLst/>
-          </a:prstGeom>
-        </p:spPr>
-        <p:txBody>
-          <a:bodyPr vert="horz" lIns="91440" tIns="45720" rIns="91440" bIns="45720" rtlCol="0">
+            <a:off x="2901951" y="864108"/>
+            <a:ext cx="5486400" cy="5120640"/>
+          </a:xfrm>
+          <a:prstGeom prst="rect">
+            <a:avLst/>
+          </a:prstGeom>
+        </p:spPr>
+        <p:txBody>
+          <a:bodyPr vert="horz" lIns="91440" tIns="45720" rIns="91440" bIns="45720" rtlCol="0" anchor="ctr">
             <a:normAutofit/>
           </a:bodyPr>
           <a:lstStyle/>
@@ -3495,8 +3460,8 @@
         </p:nvSpPr>
         <p:spPr>
           <a:xfrm>
-            <a:off x="514350" y="6412447"/>
-            <a:ext cx="3086100" cy="228600"/>
+            <a:off x="196849" y="6356351"/>
+            <a:ext cx="2057400" cy="365125"/>
           </a:xfrm>
           <a:prstGeom prst="rect">
             <a:avLst/>
@@ -3506,10 +3471,11 @@
           <a:bodyPr vert="horz" lIns="91440" tIns="45720" rIns="91440" bIns="45720" rtlCol="0" anchor="ctr"/>
           <a:lstStyle>
             <a:lvl1pPr algn="l">
-              <a:defRPr sz="950">
+              <a:defRPr sz="1000">
                 <a:solidFill>
                   <a:schemeClr val="tx1">
-                    <a:alpha val="75000"/>
+                    <a:lumMod val="50000"/>
+                    <a:lumOff val="50000"/>
                   </a:schemeClr>
                 </a:solidFill>
               </a:defRPr>
@@ -3536,8 +3502,8 @@
         </p:nvSpPr>
         <p:spPr>
           <a:xfrm>
-            <a:off x="514350" y="6554697"/>
-            <a:ext cx="3771900" cy="228600"/>
+            <a:off x="2901951" y="6356351"/>
+            <a:ext cx="4433638" cy="365125"/>
           </a:xfrm>
           <a:prstGeom prst="rect">
             <a:avLst/>
@@ -3547,10 +3513,11 @@
           <a:bodyPr vert="horz" lIns="91440" tIns="45720" rIns="91440" bIns="45720" rtlCol="0" anchor="ctr"/>
           <a:lstStyle>
             <a:lvl1pPr algn="l">
-              <a:defRPr sz="950" cap="all" baseline="0">
+              <a:defRPr sz="1000">
                 <a:solidFill>
                   <a:schemeClr val="tx1">
-                    <a:alpha val="75000"/>
+                    <a:lumMod val="50000"/>
+                    <a:lumOff val="50000"/>
                   </a:schemeClr>
                 </a:solidFill>
               </a:defRPr>
@@ -3573,27 +3540,21 @@
         </p:nvSpPr>
         <p:spPr>
           <a:xfrm>
-            <a:off x="6541193" y="5829748"/>
-            <a:ext cx="2194560" cy="1397039"/>
-          </a:xfrm>
-          <a:prstGeom prst="rect">
-            <a:avLst/>
-          </a:prstGeom>
-        </p:spPr>
-        <p:txBody>
-          <a:bodyPr vert="horz" lIns="91440" tIns="45720" rIns="91440" bIns="45720" rtlCol="0" anchor="b"/>
+            <a:off x="7975602" y="6356351"/>
+            <a:ext cx="1148195" cy="365125"/>
+          </a:xfrm>
+          <a:prstGeom prst="rect">
+            <a:avLst/>
+          </a:prstGeom>
+        </p:spPr>
+        <p:txBody>
+          <a:bodyPr vert="horz" lIns="91440" tIns="45720" rIns="91440" bIns="45720" rtlCol="0" anchor="ctr"/>
           <a:lstStyle>
             <a:lvl1pPr algn="r">
-              <a:defRPr sz="9000" b="0">
-                <a:ln>
-                  <a:noFill/>
-                </a:ln>
-                <a:solidFill>
-                  <a:schemeClr val="accent1">
-                    <a:alpha val="20000"/>
-                  </a:schemeClr>
-                </a:solidFill>
-                <a:latin typeface="+mj-lt"/>
+              <a:defRPr sz="1100" b="1">
+                <a:solidFill>
+                  <a:schemeClr val="accent1"/>
+                </a:solidFill>
               </a:defRPr>
             </a:lvl1pPr>
           </a:lstStyle>
@@ -3609,23 +3570,23 @@
     </p:spTree>
     <p:extLst>
       <p:ext uri="{BB962C8B-B14F-4D97-AF65-F5344CB8AC3E}">
-        <p14:creationId xmlns:p14="http://schemas.microsoft.com/office/powerpoint/2010/main" val="3444779075"/>
+        <p14:creationId xmlns:p14="http://schemas.microsoft.com/office/powerpoint/2010/main" val="4164060639"/>
       </p:ext>
     </p:extLst>
   </p:cSld>
   <p:clrMap bg1="lt1" tx1="dk1" bg2="lt2" tx2="dk2" accent1="accent1" accent2="accent2" accent3="accent3" accent4="accent4" accent5="accent5" accent6="accent6" hlink="hlink" folHlink="folHlink"/>
   <p:sldLayoutIdLst>
-    <p:sldLayoutId id="2147483878" r:id="rId1"/>
-    <p:sldLayoutId id="2147483879" r:id="rId2"/>
-    <p:sldLayoutId id="2147483880" r:id="rId3"/>
-    <p:sldLayoutId id="2147483881" r:id="rId4"/>
-    <p:sldLayoutId id="2147483882" r:id="rId5"/>
-    <p:sldLayoutId id="2147483883" r:id="rId6"/>
-    <p:sldLayoutId id="2147483884" r:id="rId7"/>
-    <p:sldLayoutId id="2147483885" r:id="rId8"/>
-    <p:sldLayoutId id="2147483886" r:id="rId9"/>
-    <p:sldLayoutId id="2147483887" r:id="rId10"/>
-    <p:sldLayoutId id="2147483888" r:id="rId11"/>
+    <p:sldLayoutId id="2147483924" r:id="rId1"/>
+    <p:sldLayoutId id="2147483925" r:id="rId2"/>
+    <p:sldLayoutId id="2147483926" r:id="rId3"/>
+    <p:sldLayoutId id="2147483927" r:id="rId4"/>
+    <p:sldLayoutId id="2147483928" r:id="rId5"/>
+    <p:sldLayoutId id="2147483929" r:id="rId6"/>
+    <p:sldLayoutId id="2147483930" r:id="rId7"/>
+    <p:sldLayoutId id="2147483931" r:id="rId8"/>
+    <p:sldLayoutId id="2147483932" r:id="rId9"/>
+    <p:sldLayoutId id="2147483933" r:id="rId10"/>
+    <p:sldLayoutId id="2147483934" r:id="rId11"/>
   </p:sldLayoutIdLst>
   <p:txStyles>
     <p:titleStyle>
@@ -3637,9 +3598,9 @@
           <a:spcPct val="0"/>
         </a:spcBef>
         <a:buNone/>
-        <a:defRPr sz="4800" kern="1200" spc="-120" baseline="0">
+        <a:defRPr sz="3000" kern="1200" spc="-60" baseline="0">
           <a:solidFill>
-            <a:schemeClr val="accent1"/>
+            <a:srgbClr val="FFFFFF"/>
           </a:solidFill>
           <a:latin typeface="+mj-lt"/>
           <a:ea typeface="+mj-ea"/>
@@ -3648,20 +3609,23 @@
       </a:lvl1pPr>
     </p:titleStyle>
     <p:bodyStyle>
-      <a:lvl1pPr marL="91440" indent="-91440" algn="l" defTabSz="914400" rtl="0" eaLnBrk="1" latinLnBrk="0" hangingPunct="1">
+      <a:lvl1pPr marL="182880" indent="-182880" algn="l" defTabSz="914400" rtl="0" eaLnBrk="1" latinLnBrk="0" hangingPunct="1">
         <a:lnSpc>
-          <a:spcPct val="85000"/>
+          <a:spcPct val="90000"/>
         </a:lnSpc>
         <a:spcBef>
-          <a:spcPts val="1300"/>
+          <a:spcPts val="1200"/>
         </a:spcBef>
-        <a:buFont typeface="Arial" pitchFamily="34" charset="0"/>
-        <a:buChar char=" "/>
-        <a:defRPr sz="2400" kern="1200">
+        <a:buClr>
+          <a:schemeClr val="accent1"/>
+        </a:buClr>
+        <a:buFont typeface="Wingdings 2" pitchFamily="18" charset="2"/>
+        <a:buChar char=""/>
+        <a:defRPr sz="1900" kern="1200">
           <a:solidFill>
             <a:schemeClr val="tx1">
-              <a:lumMod val="85000"/>
-              <a:lumOff val="15000"/>
+              <a:lumMod val="65000"/>
+              <a:lumOff val="35000"/>
             </a:schemeClr>
           </a:solidFill>
           <a:latin typeface="+mn-lt"/>
@@ -3669,20 +3633,26 @@
           <a:cs typeface="+mn-cs"/>
         </a:defRPr>
       </a:lvl1pPr>
-      <a:lvl2pPr marL="274320" indent="-342900" algn="l" defTabSz="914400" rtl="0" eaLnBrk="1" latinLnBrk="0" hangingPunct="1">
+      <a:lvl2pPr marL="685800" indent="-182880" algn="l" defTabSz="914400" rtl="0" eaLnBrk="1" latinLnBrk="0" hangingPunct="1">
         <a:lnSpc>
-          <a:spcPct val="85000"/>
+          <a:spcPct val="90000"/>
         </a:lnSpc>
         <a:spcBef>
-          <a:spcPts val="600"/>
+          <a:spcPts val="250"/>
         </a:spcBef>
-        <a:buFont typeface="Arial" pitchFamily="34" charset="0"/>
-        <a:buChar char=" "/>
-        <a:defRPr sz="2400" kern="1200">
+        <a:spcAft>
+          <a:spcPts val="250"/>
+        </a:spcAft>
+        <a:buClr>
+          <a:schemeClr val="accent1"/>
+        </a:buClr>
+        <a:buFont typeface="Wingdings 2" pitchFamily="18" charset="2"/>
+        <a:buChar char=""/>
+        <a:defRPr sz="1700" kern="1200">
           <a:solidFill>
             <a:schemeClr val="tx1">
-              <a:lumMod val="85000"/>
-              <a:lumOff val="15000"/>
+              <a:lumMod val="65000"/>
+              <a:lumOff val="35000"/>
             </a:schemeClr>
           </a:solidFill>
           <a:latin typeface="+mn-lt"/>
@@ -3690,20 +3660,26 @@
           <a:cs typeface="+mn-cs"/>
         </a:defRPr>
       </a:lvl2pPr>
-      <a:lvl3pPr marL="548640" indent="-548640" algn="l" defTabSz="914400" rtl="0" eaLnBrk="1" latinLnBrk="0" hangingPunct="1">
+      <a:lvl3pPr marL="1143000" indent="-182880" algn="l" defTabSz="914400" rtl="0" eaLnBrk="1" latinLnBrk="0" hangingPunct="1">
         <a:lnSpc>
-          <a:spcPct val="85000"/>
+          <a:spcPct val="90000"/>
         </a:lnSpc>
         <a:spcBef>
-          <a:spcPts val="600"/>
+          <a:spcPts val="250"/>
         </a:spcBef>
-        <a:buFont typeface="Arial" pitchFamily="34" charset="0"/>
-        <a:buChar char=" "/>
-        <a:defRPr sz="2000" i="1" kern="1200">
+        <a:spcAft>
+          <a:spcPts val="250"/>
+        </a:spcAft>
+        <a:buClr>
+          <a:schemeClr val="accent1"/>
+        </a:buClr>
+        <a:buFont typeface="Wingdings 2" pitchFamily="18" charset="2"/>
+        <a:buChar char=""/>
+        <a:defRPr sz="1500" kern="1200">
           <a:solidFill>
             <a:schemeClr val="tx1">
-              <a:lumMod val="85000"/>
-              <a:lumOff val="15000"/>
+              <a:lumMod val="65000"/>
+              <a:lumOff val="35000"/>
             </a:schemeClr>
           </a:solidFill>
           <a:latin typeface="+mn-lt"/>
@@ -3711,20 +3687,26 @@
           <a:cs typeface="+mn-cs"/>
         </a:defRPr>
       </a:lvl3pPr>
-      <a:lvl4pPr marL="822960" indent="-822960" algn="l" defTabSz="914400" rtl="0" eaLnBrk="1" latinLnBrk="0" hangingPunct="1">
+      <a:lvl4pPr marL="1600200" indent="-182880" algn="l" defTabSz="914400" rtl="0" eaLnBrk="1" latinLnBrk="0" hangingPunct="1">
         <a:lnSpc>
-          <a:spcPct val="85000"/>
+          <a:spcPct val="90000"/>
         </a:lnSpc>
         <a:spcBef>
-          <a:spcPts val="600"/>
+          <a:spcPts val="250"/>
         </a:spcBef>
-        <a:buFont typeface="Arial" pitchFamily="34" charset="0"/>
-        <a:buChar char=" "/>
-        <a:defRPr sz="1800" kern="1200">
+        <a:spcAft>
+          <a:spcPts val="250"/>
+        </a:spcAft>
+        <a:buClr>
+          <a:schemeClr val="accent1"/>
+        </a:buClr>
+        <a:buFont typeface="Wingdings 2" pitchFamily="18" charset="2"/>
+        <a:buChar char=""/>
+        <a:defRPr sz="1300" kern="1200">
           <a:solidFill>
             <a:schemeClr val="tx1">
-              <a:lumMod val="85000"/>
-              <a:lumOff val="15000"/>
+              <a:lumMod val="65000"/>
+              <a:lumOff val="35000"/>
             </a:schemeClr>
           </a:solidFill>
           <a:latin typeface="+mn-lt"/>
@@ -3732,20 +3714,26 @@
           <a:cs typeface="+mn-cs"/>
         </a:defRPr>
       </a:lvl4pPr>
-      <a:lvl5pPr marL="1097280" indent="-1097280" algn="l" defTabSz="914400" rtl="0" eaLnBrk="1" latinLnBrk="0" hangingPunct="1">
+      <a:lvl5pPr marL="2057400" indent="-182880" algn="l" defTabSz="914400" rtl="0" eaLnBrk="1" latinLnBrk="0" hangingPunct="1">
         <a:lnSpc>
-          <a:spcPct val="85000"/>
+          <a:spcPct val="90000"/>
         </a:lnSpc>
         <a:spcBef>
-          <a:spcPts val="600"/>
+          <a:spcPts val="250"/>
         </a:spcBef>
-        <a:buFont typeface="Arial" pitchFamily="34" charset="0"/>
-        <a:buChar char=" "/>
-        <a:defRPr sz="1800" kern="1200">
+        <a:spcAft>
+          <a:spcPts val="250"/>
+        </a:spcAft>
+        <a:buClr>
+          <a:schemeClr val="accent1"/>
+        </a:buClr>
+        <a:buFont typeface="Wingdings 2" pitchFamily="18" charset="2"/>
+        <a:buChar char=""/>
+        <a:defRPr sz="1300" kern="1200">
           <a:solidFill>
             <a:schemeClr val="tx1">
-              <a:lumMod val="85000"/>
-              <a:lumOff val="15000"/>
+              <a:lumMod val="65000"/>
+              <a:lumOff val="35000"/>
             </a:schemeClr>
           </a:solidFill>
           <a:latin typeface="+mn-lt"/>
@@ -3753,20 +3741,26 @@
           <a:cs typeface="+mn-cs"/>
         </a:defRPr>
       </a:lvl5pPr>
-      <a:lvl6pPr marL="1200000" indent="-228600" algn="l" defTabSz="914400" rtl="0" eaLnBrk="1" latinLnBrk="0" hangingPunct="1">
+      <a:lvl6pPr marL="2514600" indent="-228600" algn="l" defTabSz="914400" rtl="0" eaLnBrk="1" latinLnBrk="0" hangingPunct="1">
         <a:lnSpc>
-          <a:spcPct val="85000"/>
+          <a:spcPct val="90000"/>
         </a:lnSpc>
         <a:spcBef>
-          <a:spcPts val="600"/>
+          <a:spcPts val="250"/>
         </a:spcBef>
-        <a:buFont typeface="Arial" pitchFamily="34" charset="0"/>
-        <a:buChar char=" "/>
-        <a:defRPr sz="1800" kern="1200">
+        <a:spcAft>
+          <a:spcPts val="250"/>
+        </a:spcAft>
+        <a:buClr>
+          <a:schemeClr val="accent1"/>
+        </a:buClr>
+        <a:buFont typeface="Wingdings 2" pitchFamily="18" charset="2"/>
+        <a:buChar char=""/>
+        <a:defRPr sz="1300" kern="1200">
           <a:solidFill>
             <a:schemeClr val="tx1">
-              <a:lumMod val="85000"/>
-              <a:lumOff val="15000"/>
+              <a:lumMod val="65000"/>
+              <a:lumOff val="35000"/>
             </a:schemeClr>
           </a:solidFill>
           <a:latin typeface="+mn-lt"/>
@@ -3774,20 +3768,26 @@
           <a:cs typeface="+mn-cs"/>
         </a:defRPr>
       </a:lvl6pPr>
-      <a:lvl7pPr marL="1400000" indent="-228600" algn="l" defTabSz="914400" rtl="0" eaLnBrk="1" latinLnBrk="0" hangingPunct="1">
+      <a:lvl7pPr marL="2971800" indent="-228600" algn="l" defTabSz="914400" rtl="0" eaLnBrk="1" latinLnBrk="0" hangingPunct="1">
         <a:lnSpc>
-          <a:spcPct val="85000"/>
+          <a:spcPct val="90000"/>
         </a:lnSpc>
         <a:spcBef>
-          <a:spcPts val="600"/>
+          <a:spcPts val="250"/>
         </a:spcBef>
-        <a:buFont typeface="Arial" pitchFamily="34" charset="0"/>
-        <a:buChar char=" "/>
-        <a:defRPr sz="1800" kern="1200">
+        <a:spcAft>
+          <a:spcPts val="250"/>
+        </a:spcAft>
+        <a:buClr>
+          <a:schemeClr val="accent1"/>
+        </a:buClr>
+        <a:buFont typeface="Wingdings 2" pitchFamily="18" charset="2"/>
+        <a:buChar char=""/>
+        <a:defRPr sz="1300" kern="1200">
           <a:solidFill>
             <a:schemeClr val="tx1">
-              <a:lumMod val="85000"/>
-              <a:lumOff val="15000"/>
+              <a:lumMod val="65000"/>
+              <a:lumOff val="35000"/>
             </a:schemeClr>
           </a:solidFill>
           <a:latin typeface="+mn-lt"/>
@@ -3795,20 +3795,26 @@
           <a:cs typeface="+mn-cs"/>
         </a:defRPr>
       </a:lvl7pPr>
-      <a:lvl8pPr marL="1600000" indent="-228600" algn="l" defTabSz="914400" rtl="0" eaLnBrk="1" latinLnBrk="0" hangingPunct="1">
+      <a:lvl8pPr marL="3429000" indent="-228600" algn="l" defTabSz="914400" rtl="0" eaLnBrk="1" latinLnBrk="0" hangingPunct="1">
         <a:lnSpc>
-          <a:spcPct val="85000"/>
+          <a:spcPct val="90000"/>
         </a:lnSpc>
         <a:spcBef>
-          <a:spcPts val="600"/>
+          <a:spcPts val="250"/>
         </a:spcBef>
-        <a:buFont typeface="Arial" pitchFamily="34" charset="0"/>
-        <a:buChar char=" "/>
-        <a:defRPr sz="1800" kern="1200">
+        <a:spcAft>
+          <a:spcPts val="250"/>
+        </a:spcAft>
+        <a:buClr>
+          <a:schemeClr val="accent1"/>
+        </a:buClr>
+        <a:buFont typeface="Wingdings 2" pitchFamily="18" charset="2"/>
+        <a:buChar char=""/>
+        <a:defRPr sz="1300" kern="1200">
           <a:solidFill>
             <a:schemeClr val="tx1">
-              <a:lumMod val="85000"/>
-              <a:lumOff val="15000"/>
+              <a:lumMod val="65000"/>
+              <a:lumOff val="35000"/>
             </a:schemeClr>
           </a:solidFill>
           <a:latin typeface="+mn-lt"/>
@@ -3816,20 +3822,26 @@
           <a:cs typeface="+mn-cs"/>
         </a:defRPr>
       </a:lvl8pPr>
-      <a:lvl9pPr marL="1800000" indent="-228600" algn="l" defTabSz="914400" rtl="0" eaLnBrk="1" latinLnBrk="0" hangingPunct="1">
+      <a:lvl9pPr marL="3886200" indent="-228600" algn="l" defTabSz="914400" rtl="0" eaLnBrk="1" latinLnBrk="0" hangingPunct="1">
         <a:lnSpc>
-          <a:spcPct val="85000"/>
+          <a:spcPct val="90000"/>
         </a:lnSpc>
         <a:spcBef>
-          <a:spcPts val="600"/>
+          <a:spcPts val="250"/>
         </a:spcBef>
-        <a:buFont typeface="Arial" pitchFamily="34" charset="0"/>
-        <a:buChar char=" "/>
-        <a:defRPr sz="1800" kern="1200">
+        <a:spcAft>
+          <a:spcPts val="250"/>
+        </a:spcAft>
+        <a:buClr>
+          <a:schemeClr val="accent1"/>
+        </a:buClr>
+        <a:buFont typeface="Wingdings 2" pitchFamily="18" charset="2"/>
+        <a:buChar char=""/>
+        <a:defRPr sz="1300" kern="1200">
           <a:solidFill>
             <a:schemeClr val="tx1">
-              <a:lumMod val="85000"/>
-              <a:lumOff val="15000"/>
+              <a:lumMod val="65000"/>
+              <a:lumOff val="35000"/>
             </a:schemeClr>
           </a:solidFill>
           <a:latin typeface="+mn-lt"/>
@@ -11916,62 +11928,62 @@
 </file>
 
 <file path=ppt/theme/theme1.xml><?xml version="1.0" encoding="utf-8"?>
-<a:theme xmlns:a="http://schemas.openxmlformats.org/drawingml/2006/main" name="Metropolitan">
+<a:theme xmlns:a="http://schemas.openxmlformats.org/drawingml/2006/main" name="Frame">
   <a:themeElements>
-    <a:clrScheme name="Metropolitan">
+    <a:clrScheme name="Frame">
       <a:dk1>
-        <a:sysClr val="windowText" lastClr="000000"/>
+        <a:srgbClr val="000000"/>
       </a:dk1>
       <a:lt1>
-        <a:sysClr val="window" lastClr="FFFFFF"/>
+        <a:srgbClr val="FFFFFF"/>
       </a:lt1>
       <a:dk2>
-        <a:srgbClr val="4E3B30"/>
+        <a:srgbClr val="545454"/>
       </a:dk2>
       <a:lt2>
-        <a:srgbClr val="FBEEC9"/>
+        <a:srgbClr val="BFBFBF"/>
       </a:lt2>
       <a:accent1>
-        <a:srgbClr val="F0A22E"/>
+        <a:srgbClr val="40BAD2"/>
       </a:accent1>
       <a:accent2>
-        <a:srgbClr val="A5644E"/>
+        <a:srgbClr val="FAB900"/>
       </a:accent2>
       <a:accent3>
-        <a:srgbClr val="B58B80"/>
+        <a:srgbClr val="90BB23"/>
       </a:accent3>
       <a:accent4>
-        <a:srgbClr val="C3986D"/>
+        <a:srgbClr val="EE7008"/>
       </a:accent4>
       <a:accent5>
-        <a:srgbClr val="A19574"/>
+        <a:srgbClr val="1AB39F"/>
       </a:accent5>
       <a:accent6>
-        <a:srgbClr val="C17529"/>
+        <a:srgbClr val="D5393D"/>
       </a:accent6>
       <a:hlink>
-        <a:srgbClr val="AD1F1F"/>
+        <a:srgbClr val="90BB23"/>
       </a:hlink>
       <a:folHlink>
-        <a:srgbClr val="FFC42F"/>
+        <a:srgbClr val="EE7008"/>
       </a:folHlink>
     </a:clrScheme>
-    <a:fontScheme name="Metropolitan">
+    <a:fontScheme name="Frame">
       <a:majorFont>
-        <a:latin typeface="Calibri Light" panose="020F0302020204030204"/>
+        <a:latin typeface="Corbel" panose="020B0503020204020204"/>
         <a:ea typeface=""/>
         <a:cs typeface=""/>
-        <a:font script="Jpan" typeface="ＭＳ Ｐゴシック"/>
-        <a:font script="Hang" typeface="맑은 고딕"/>
-        <a:font script="Hans" typeface="宋体"/>
-        <a:font script="Hant" typeface="新細明體"/>
-        <a:font script="Arab" typeface="Times New Roman"/>
-        <a:font script="Hebr" typeface="Times New Roman"/>
-        <a:font script="Thai" typeface="Angsana New"/>
+        <a:font script="Jpan" typeface="ＭＳ ゴシック"/>
+        <a:font script="Hang" typeface="HY중고딕"/>
+        <a:font script="Hans" typeface="幼圆"/>
+        <a:font script="Hant" typeface="微軟正黑體"/>
+        <a:font script="Arab" typeface="Tahoma"/>
+        <a:font script="Hebr" typeface="Gisha"/>
+        <a:font script="Thai" typeface="DilleniaUPC"/>
         <a:font script="Ethi" typeface="Nyala"/>
         <a:font script="Beng" typeface="Vrinda"/>
         <a:font script="Gujr" typeface="Shruti"/>
-        <a:font script="Khmr" typeface="MoolBoran"/>
+        <a:font script="Khmr" typeface="DaunPenh"/>
         <a:font script="Knda" typeface="Tunga"/>
         <a:font script="Guru" typeface="Raavi"/>
         <a:font script="Cans" typeface="Euphemia"/>
@@ -11988,25 +12000,25 @@
         <a:font script="Laoo" typeface="DokChampa"/>
         <a:font script="Sinh" typeface="Iskoola Pota"/>
         <a:font script="Mong" typeface="Mongolian Baiti"/>
-        <a:font script="Viet" typeface="Times New Roman"/>
+        <a:font script="Viet" typeface="Tahoma"/>
         <a:font script="Uigh" typeface="Microsoft Uighur"/>
         <a:font script="Geor" typeface="Sylfaen"/>
       </a:majorFont>
       <a:minorFont>
-        <a:latin typeface="Calibri Light" panose="020F0302020204030204"/>
+        <a:latin typeface="Corbel" panose="020B0503020204020204"/>
         <a:ea typeface=""/>
         <a:cs typeface=""/>
-        <a:font script="Jpan" typeface="ＭＳ Ｐゴシック"/>
-        <a:font script="Hang" typeface="맑은 고딕"/>
-        <a:font script="Hans" typeface="宋体"/>
-        <a:font script="Hant" typeface="新細明體"/>
-        <a:font script="Arab" typeface="Times New Roman"/>
-        <a:font script="Hebr" typeface="Times New Roman"/>
-        <a:font script="Thai" typeface="Angsana New"/>
+        <a:font script="Jpan" typeface="ＭＳ ゴシック"/>
+        <a:font script="Hang" typeface="HY중고딕"/>
+        <a:font script="Hans" typeface="幼圆"/>
+        <a:font script="Hant" typeface="微軟正黑體"/>
+        <a:font script="Arab" typeface="Tahoma"/>
+        <a:font script="Hebr" typeface="Gisha"/>
+        <a:font script="Thai" typeface="DilleniaUPC"/>
         <a:font script="Ethi" typeface="Nyala"/>
         <a:font script="Beng" typeface="Vrinda"/>
         <a:font script="Gujr" typeface="Shruti"/>
-        <a:font script="Khmr" typeface="MoolBoran"/>
+        <a:font script="Khmr" typeface="DaunPenh"/>
         <a:font script="Knda" typeface="Tunga"/>
         <a:font script="Guru" typeface="Raavi"/>
         <a:font script="Cans" typeface="Euphemia"/>
@@ -12023,68 +12035,27 @@
         <a:font script="Laoo" typeface="DokChampa"/>
         <a:font script="Sinh" typeface="Iskoola Pota"/>
         <a:font script="Mong" typeface="Mongolian Baiti"/>
-        <a:font script="Viet" typeface="Times New Roman"/>
+        <a:font script="Viet" typeface="Verdana"/>
         <a:font script="Uigh" typeface="Microsoft Uighur"/>
         <a:font script="Geor" typeface="Sylfaen"/>
       </a:minorFont>
     </a:fontScheme>
-    <a:fmtScheme name="Metropolitan">
+    <a:fmtScheme name="Frame">
       <a:fillStyleLst>
         <a:solidFill>
           <a:schemeClr val="phClr"/>
         </a:solidFill>
-        <a:gradFill rotWithShape="1">
-          <a:gsLst>
-            <a:gs pos="0">
-              <a:schemeClr val="phClr">
-                <a:tint val="70000"/>
-                <a:satMod val="100000"/>
-                <a:lumMod val="110000"/>
-              </a:schemeClr>
-            </a:gs>
-            <a:gs pos="50000">
-              <a:schemeClr val="phClr">
-                <a:tint val="75000"/>
-                <a:satMod val="101000"/>
-                <a:lumMod val="105000"/>
-              </a:schemeClr>
-            </a:gs>
-            <a:gs pos="100000">
-              <a:schemeClr val="phClr">
-                <a:tint val="82000"/>
-                <a:satMod val="104000"/>
-                <a:lumMod val="105000"/>
-              </a:schemeClr>
-            </a:gs>
-          </a:gsLst>
-          <a:lin ang="2700000" scaled="0"/>
-        </a:gradFill>
-        <a:gradFill rotWithShape="1">
-          <a:gsLst>
-            <a:gs pos="0">
-              <a:schemeClr val="phClr">
-                <a:tint val="97000"/>
-                <a:satMod val="100000"/>
-                <a:lumMod val="102000"/>
-              </a:schemeClr>
-            </a:gs>
-            <a:gs pos="50000">
-              <a:schemeClr val="phClr">
-                <a:shade val="100000"/>
-                <a:satMod val="100000"/>
-                <a:lumMod val="100000"/>
-              </a:schemeClr>
-            </a:gs>
-            <a:gs pos="100000">
-              <a:schemeClr val="phClr">
-                <a:shade val="80000"/>
-                <a:satMod val="100000"/>
-                <a:lumMod val="99000"/>
-              </a:schemeClr>
-            </a:gs>
-          </a:gsLst>
-          <a:lin ang="2700000" scaled="0"/>
-        </a:gradFill>
+        <a:solidFill>
+          <a:schemeClr val="phClr">
+            <a:tint val="65000"/>
+          </a:schemeClr>
+        </a:solidFill>
+        <a:solidFill>
+          <a:schemeClr val="phClr">
+            <a:shade val="80000"/>
+            <a:satMod val="150000"/>
+          </a:schemeClr>
+        </a:solidFill>
       </a:fillStyleLst>
       <a:lnStyleLst>
         <a:ln w="9525" cap="flat" cmpd="sng" algn="ctr">
@@ -12093,15 +12064,19 @@
           </a:solidFill>
           <a:prstDash val="solid"/>
         </a:ln>
-        <a:ln w="12700" cap="flat" cmpd="sng" algn="ctr">
+        <a:ln w="10795" cap="flat" cmpd="sng" algn="ctr">
           <a:solidFill>
             <a:schemeClr val="phClr"/>
           </a:solidFill>
           <a:prstDash val="solid"/>
         </a:ln>
-        <a:ln w="19050" cap="flat" cmpd="sng" algn="ctr">
+        <a:ln w="17145" cap="flat" cmpd="sng" algn="ctr">
           <a:solidFill>
-            <a:schemeClr val="phClr"/>
+            <a:schemeClr val="phClr">
+              <a:shade val="95000"/>
+              <a:alpha val="50000"/>
+              <a:satMod val="150000"/>
+            </a:schemeClr>
           </a:solidFill>
           <a:prstDash val="solid"/>
         </a:ln>
@@ -12115,12 +12090,21 @@
         </a:effectStyle>
         <a:effectStyle>
           <a:effectLst>
-            <a:outerShdw blurRad="57150" dist="19050" dir="5400000" algn="ctr" rotWithShape="0">
+            <a:outerShdw blurRad="44450" dist="13970" dir="5400000" algn="ctr" rotWithShape="0">
               <a:srgbClr val="000000">
-                <a:alpha val="63000"/>
+                <a:alpha val="45000"/>
               </a:srgbClr>
             </a:outerShdw>
           </a:effectLst>
+          <a:scene3d>
+            <a:camera prst="orthographicFront">
+              <a:rot lat="0" lon="0" rev="0"/>
+            </a:camera>
+            <a:lightRig rig="twoPt" dir="tl"/>
+          </a:scene3d>
+          <a:sp3d prstMaterial="flat">
+            <a:bevelT w="12700" h="25400" prst="coolSlant"/>
+          </a:sp3d>
         </a:effectStyle>
       </a:effectStyleLst>
       <a:bgFillStyleLst>
@@ -12133,12 +12117,34 @@
             <a:satMod val="170000"/>
           </a:schemeClr>
         </a:solidFill>
-        <a:solidFill>
-          <a:schemeClr val="phClr">
-            <a:shade val="95000"/>
-            <a:satMod val="170000"/>
-          </a:schemeClr>
-        </a:solidFill>
+        <a:gradFill rotWithShape="1">
+          <a:gsLst>
+            <a:gs pos="0">
+              <a:schemeClr val="phClr">
+                <a:tint val="93000"/>
+                <a:shade val="98000"/>
+                <a:satMod val="120000"/>
+                <a:lumMod val="102000"/>
+              </a:schemeClr>
+            </a:gs>
+            <a:gs pos="48000">
+              <a:schemeClr val="phClr">
+                <a:tint val="98000"/>
+                <a:shade val="90000"/>
+                <a:satMod val="110000"/>
+                <a:lumMod val="103000"/>
+              </a:schemeClr>
+            </a:gs>
+            <a:gs pos="100000">
+              <a:schemeClr val="phClr">
+                <a:tint val="98000"/>
+                <a:shade val="80000"/>
+                <a:satMod val="100000"/>
+              </a:schemeClr>
+            </a:gs>
+          </a:gsLst>
+          <a:lin ang="5400000" scaled="0"/>
+        </a:gradFill>
       </a:bgFillStyleLst>
     </a:fmtScheme>
   </a:themeElements>
@@ -12146,7 +12152,7 @@
   <a:extraClrSchemeLst/>
   <a:extLst>
     <a:ext uri="{05A4C25C-085E-4340-85A3-A5531E510DB2}">
-      <thm15:themeFamily xmlns:thm15="http://schemas.microsoft.com/office/thememl/2012/main" name="Metropolitan" id="{4C5440D6-04D2-4954-96CF-F251137069B2}" vid="{0941A018-FB9B-4401-A32C-7E04526866E0}"/>
+      <thm15:themeFamily xmlns:thm15="http://schemas.microsoft.com/office/thememl/2012/main" name="Frame" id="{F226E7A2-7162-461C-9490-D27D9DC04E43}" vid="{629A0216-3BBD-45C0-B63F-2683BEA18F60}"/>
     </a:ext>
   </a:extLst>
 </a:theme>

</xml_diff>